<commit_message>
Changes in Display firmware
- Restart log button
- Damper with single Pitmaster
</commit_message>
<xml_diff>
--- a/nextion/Nextion Design Blackline2.pptx
+++ b/nextion/Nextion Design Blackline2.pptx
@@ -110,7 +110,27 @@
       </a:defRPr>
     </a:lvl9pPr>
   </p:defaultTextStyle>
+  <p:extLst>
+    <p:ext uri="{EFAFB233-063F-42B5-8137-9DF3F51BA10A}">
+      <p15:sldGuideLst xmlns:p15="http://schemas.microsoft.com/office/powerpoint/2012/main">
+        <p15:guide id="1" orient="horz" pos="2160">
+          <p15:clr>
+            <a:srgbClr val="A4A3A4"/>
+          </p15:clr>
+        </p15:guide>
+        <p15:guide id="2" pos="2880">
+          <p15:clr>
+            <a:srgbClr val="A4A3A4"/>
+          </p15:clr>
+        </p15:guide>
+      </p15:sldGuideLst>
+    </p:ext>
+  </p:extLst>
 </p:presentation>
+</file>
+
+<file path=ppt/revisionInfo.xml><?xml version="1.0" encoding="utf-8"?>
+<p1510:revInfo xmlns:a="http://schemas.openxmlformats.org/drawingml/2006/main" xmlns:r="http://schemas.openxmlformats.org/officeDocument/2006/relationships" xmlns:p1510="http://schemas.microsoft.com/office/powerpoint/2015/10/main"/>
 </file>
 
 <file path=ppt/notesMasters/notesMaster1.xml><?xml version="1.0" encoding="utf-8"?>
@@ -195,7 +215,7 @@
           <a:p>
             <a:fld id="{8D517593-08C0-4018-93B2-F3F391CB7703}" type="datetimeFigureOut">
               <a:rPr lang="de-DE" smtClean="0"/>
-              <a:t>03.11.2016</a:t>
+              <a:t>13.11.2017</a:t>
             </a:fld>
             <a:endParaRPr lang="de-DE"/>
           </a:p>
@@ -259,38 +279,37 @@
           <a:p>
             <a:pPr lvl="0"/>
             <a:r>
-              <a:rPr lang="de-DE" smtClean="0"/>
+              <a:rPr lang="de-DE"/>
               <a:t>Textmasterformat bearbeiten</a:t>
             </a:r>
           </a:p>
           <a:p>
             <a:pPr lvl="1"/>
             <a:r>
-              <a:rPr lang="de-DE" smtClean="0"/>
+              <a:rPr lang="de-DE"/>
               <a:t>Zweite Ebene</a:t>
             </a:r>
           </a:p>
           <a:p>
             <a:pPr lvl="2"/>
             <a:r>
-              <a:rPr lang="de-DE" smtClean="0"/>
+              <a:rPr lang="de-DE"/>
               <a:t>Dritte Ebene</a:t>
             </a:r>
           </a:p>
           <a:p>
             <a:pPr lvl="3"/>
             <a:r>
-              <a:rPr lang="de-DE" smtClean="0"/>
+              <a:rPr lang="de-DE"/>
               <a:t>Vierte Ebene</a:t>
             </a:r>
           </a:p>
           <a:p>
             <a:pPr lvl="4"/>
             <a:r>
-              <a:rPr lang="de-DE" smtClean="0"/>
+              <a:rPr lang="de-DE"/>
               <a:t>Fünfte Ebene</a:t>
             </a:r>
-            <a:endParaRPr lang="de-DE"/>
           </a:p>
         </p:txBody>
       </p:sp>
@@ -585,10 +604,9 @@
           <a:lstStyle/>
           <a:p>
             <a:r>
-              <a:rPr lang="de-DE" smtClean="0"/>
+              <a:rPr lang="de-DE"/>
               <a:t>Titelmasterformat durch Klicken bearbeiten</a:t>
             </a:r>
-            <a:endParaRPr lang="de-DE"/>
           </a:p>
         </p:txBody>
       </p:sp>
@@ -704,10 +722,9 @@
           </a:lstStyle>
           <a:p>
             <a:r>
-              <a:rPr lang="de-DE" smtClean="0"/>
+              <a:rPr lang="de-DE"/>
               <a:t>Formatvorlage des Untertitelmasters durch Klicken bearbeiten</a:t>
             </a:r>
-            <a:endParaRPr lang="de-DE"/>
           </a:p>
         </p:txBody>
       </p:sp>
@@ -728,7 +745,7 @@
           <a:p>
             <a:fld id="{1BA50D42-C9CD-4801-B293-61D1F53EC57E}" type="datetimeFigureOut">
               <a:rPr lang="de-DE" smtClean="0"/>
-              <a:t>03.11.2016</a:t>
+              <a:t>13.11.2017</a:t>
             </a:fld>
             <a:endParaRPr lang="de-DE"/>
           </a:p>
@@ -817,10 +834,9 @@
           <a:lstStyle/>
           <a:p>
             <a:r>
-              <a:rPr lang="de-DE" smtClean="0"/>
+              <a:rPr lang="de-DE"/>
               <a:t>Titelmasterformat durch Klicken bearbeiten</a:t>
             </a:r>
-            <a:endParaRPr lang="de-DE"/>
           </a:p>
         </p:txBody>
       </p:sp>
@@ -841,38 +857,37 @@
           <a:p>
             <a:pPr lvl="0"/>
             <a:r>
-              <a:rPr lang="de-DE" smtClean="0"/>
+              <a:rPr lang="de-DE"/>
               <a:t>Textmasterformate durch Klicken bearbeiten</a:t>
             </a:r>
           </a:p>
           <a:p>
             <a:pPr lvl="1"/>
             <a:r>
-              <a:rPr lang="de-DE" smtClean="0"/>
+              <a:rPr lang="de-DE"/>
               <a:t>Zweite Ebene</a:t>
             </a:r>
           </a:p>
           <a:p>
             <a:pPr lvl="2"/>
             <a:r>
-              <a:rPr lang="de-DE" smtClean="0"/>
+              <a:rPr lang="de-DE"/>
               <a:t>Dritte Ebene</a:t>
             </a:r>
           </a:p>
           <a:p>
             <a:pPr lvl="3"/>
             <a:r>
-              <a:rPr lang="de-DE" smtClean="0"/>
+              <a:rPr lang="de-DE"/>
               <a:t>Vierte Ebene</a:t>
             </a:r>
           </a:p>
           <a:p>
             <a:pPr lvl="4"/>
             <a:r>
-              <a:rPr lang="de-DE" smtClean="0"/>
+              <a:rPr lang="de-DE"/>
               <a:t>Fünfte Ebene</a:t>
             </a:r>
-            <a:endParaRPr lang="de-DE"/>
           </a:p>
         </p:txBody>
       </p:sp>
@@ -893,7 +908,7 @@
           <a:p>
             <a:fld id="{1BA50D42-C9CD-4801-B293-61D1F53EC57E}" type="datetimeFigureOut">
               <a:rPr lang="de-DE" smtClean="0"/>
-              <a:t>03.11.2016</a:t>
+              <a:t>13.11.2017</a:t>
             </a:fld>
             <a:endParaRPr lang="de-DE"/>
           </a:p>
@@ -987,10 +1002,9 @@
           <a:lstStyle/>
           <a:p>
             <a:r>
-              <a:rPr lang="de-DE" smtClean="0"/>
+              <a:rPr lang="de-DE"/>
               <a:t>Titel durch Klicken hinzufügen</a:t>
             </a:r>
-            <a:endParaRPr lang="de-DE"/>
           </a:p>
         </p:txBody>
       </p:sp>
@@ -1016,38 +1030,37 @@
           <a:p>
             <a:pPr lvl="0"/>
             <a:r>
-              <a:rPr lang="de-DE" smtClean="0"/>
+              <a:rPr lang="de-DE"/>
               <a:t>Textmasterformate durch Klicken bearbeiten</a:t>
             </a:r>
           </a:p>
           <a:p>
             <a:pPr lvl="1"/>
             <a:r>
-              <a:rPr lang="de-DE" smtClean="0"/>
+              <a:rPr lang="de-DE"/>
               <a:t>Zweite Ebene</a:t>
             </a:r>
           </a:p>
           <a:p>
             <a:pPr lvl="2"/>
             <a:r>
-              <a:rPr lang="de-DE" smtClean="0"/>
+              <a:rPr lang="de-DE"/>
               <a:t>Dritte Ebene</a:t>
             </a:r>
           </a:p>
           <a:p>
             <a:pPr lvl="3"/>
             <a:r>
-              <a:rPr lang="de-DE" smtClean="0"/>
+              <a:rPr lang="de-DE"/>
               <a:t>Vierte Ebene</a:t>
             </a:r>
           </a:p>
           <a:p>
             <a:pPr lvl="4"/>
             <a:r>
-              <a:rPr lang="de-DE" smtClean="0"/>
+              <a:rPr lang="de-DE"/>
               <a:t>Fünfte Ebene</a:t>
             </a:r>
-            <a:endParaRPr lang="de-DE"/>
           </a:p>
         </p:txBody>
       </p:sp>
@@ -1068,7 +1081,7 @@
           <a:p>
             <a:fld id="{1BA50D42-C9CD-4801-B293-61D1F53EC57E}" type="datetimeFigureOut">
               <a:rPr lang="de-DE" smtClean="0"/>
-              <a:t>03.11.2016</a:t>
+              <a:t>13.11.2017</a:t>
             </a:fld>
             <a:endParaRPr lang="de-DE"/>
           </a:p>
@@ -1157,10 +1170,9 @@
           <a:lstStyle/>
           <a:p>
             <a:r>
-              <a:rPr lang="de-DE" smtClean="0"/>
+              <a:rPr lang="de-DE"/>
               <a:t>Titelmasterformat durch Klicken bearbeiten</a:t>
             </a:r>
-            <a:endParaRPr lang="de-DE"/>
           </a:p>
         </p:txBody>
       </p:sp>
@@ -1181,38 +1193,37 @@
           <a:p>
             <a:pPr lvl="0"/>
             <a:r>
-              <a:rPr lang="de-DE" smtClean="0"/>
+              <a:rPr lang="de-DE"/>
               <a:t>Textmasterformate durch Klicken bearbeiten</a:t>
             </a:r>
           </a:p>
           <a:p>
             <a:pPr lvl="1"/>
             <a:r>
-              <a:rPr lang="de-DE" smtClean="0"/>
+              <a:rPr lang="de-DE"/>
               <a:t>Zweite Ebene</a:t>
             </a:r>
           </a:p>
           <a:p>
             <a:pPr lvl="2"/>
             <a:r>
-              <a:rPr lang="de-DE" smtClean="0"/>
+              <a:rPr lang="de-DE"/>
               <a:t>Dritte Ebene</a:t>
             </a:r>
           </a:p>
           <a:p>
             <a:pPr lvl="3"/>
             <a:r>
-              <a:rPr lang="de-DE" smtClean="0"/>
+              <a:rPr lang="de-DE"/>
               <a:t>Vierte Ebene</a:t>
             </a:r>
           </a:p>
           <a:p>
             <a:pPr lvl="4"/>
             <a:r>
-              <a:rPr lang="de-DE" smtClean="0"/>
+              <a:rPr lang="de-DE"/>
               <a:t>Fünfte Ebene</a:t>
             </a:r>
-            <a:endParaRPr lang="de-DE"/>
           </a:p>
         </p:txBody>
       </p:sp>
@@ -1233,7 +1244,7 @@
           <a:p>
             <a:fld id="{1BA50D42-C9CD-4801-B293-61D1F53EC57E}" type="datetimeFigureOut">
               <a:rPr lang="de-DE" smtClean="0"/>
-              <a:t>03.11.2016</a:t>
+              <a:t>13.11.2017</a:t>
             </a:fld>
             <a:endParaRPr lang="de-DE"/>
           </a:p>
@@ -1331,10 +1342,9 @@
           </a:lstStyle>
           <a:p>
             <a:r>
-              <a:rPr lang="de-DE" smtClean="0"/>
+              <a:rPr lang="de-DE"/>
               <a:t>Titelmasterformat durch Klicken bearbeiten</a:t>
             </a:r>
-            <a:endParaRPr lang="de-DE"/>
           </a:p>
         </p:txBody>
       </p:sp>
@@ -1451,7 +1461,7 @@
           <a:p>
             <a:pPr lvl="0"/>
             <a:r>
-              <a:rPr lang="de-DE" smtClean="0"/>
+              <a:rPr lang="de-DE"/>
               <a:t>Textmasterformate durch Klicken bearbeiten</a:t>
             </a:r>
           </a:p>
@@ -1474,7 +1484,7 @@
           <a:p>
             <a:fld id="{1BA50D42-C9CD-4801-B293-61D1F53EC57E}" type="datetimeFigureOut">
               <a:rPr lang="de-DE" smtClean="0"/>
-              <a:t>03.11.2016</a:t>
+              <a:t>13.11.2017</a:t>
             </a:fld>
             <a:endParaRPr lang="de-DE"/>
           </a:p>
@@ -1563,10 +1573,9 @@
           <a:lstStyle/>
           <a:p>
             <a:r>
-              <a:rPr lang="de-DE" smtClean="0"/>
+              <a:rPr lang="de-DE"/>
               <a:t>Titelmasterformat durch Klicken bearbeiten</a:t>
             </a:r>
-            <a:endParaRPr lang="de-DE"/>
           </a:p>
         </p:txBody>
       </p:sp>
@@ -1620,38 +1629,37 @@
           <a:p>
             <a:pPr lvl="0"/>
             <a:r>
-              <a:rPr lang="de-DE" smtClean="0"/>
+              <a:rPr lang="de-DE"/>
               <a:t>Textmasterformate durch Klicken bearbeiten</a:t>
             </a:r>
           </a:p>
           <a:p>
             <a:pPr lvl="1"/>
             <a:r>
-              <a:rPr lang="de-DE" smtClean="0"/>
+              <a:rPr lang="de-DE"/>
               <a:t>Zweite Ebene</a:t>
             </a:r>
           </a:p>
           <a:p>
             <a:pPr lvl="2"/>
             <a:r>
-              <a:rPr lang="de-DE" smtClean="0"/>
+              <a:rPr lang="de-DE"/>
               <a:t>Dritte Ebene</a:t>
             </a:r>
           </a:p>
           <a:p>
             <a:pPr lvl="3"/>
             <a:r>
-              <a:rPr lang="de-DE" smtClean="0"/>
+              <a:rPr lang="de-DE"/>
               <a:t>Vierte Ebene</a:t>
             </a:r>
           </a:p>
           <a:p>
             <a:pPr lvl="4"/>
             <a:r>
-              <a:rPr lang="de-DE" smtClean="0"/>
+              <a:rPr lang="de-DE"/>
               <a:t>Fünfte Ebene</a:t>
             </a:r>
-            <a:endParaRPr lang="de-DE"/>
           </a:p>
         </p:txBody>
       </p:sp>
@@ -1705,38 +1713,37 @@
           <a:p>
             <a:pPr lvl="0"/>
             <a:r>
-              <a:rPr lang="de-DE" smtClean="0"/>
+              <a:rPr lang="de-DE"/>
               <a:t>Textmasterformate durch Klicken bearbeiten</a:t>
             </a:r>
           </a:p>
           <a:p>
             <a:pPr lvl="1"/>
             <a:r>
-              <a:rPr lang="de-DE" smtClean="0"/>
+              <a:rPr lang="de-DE"/>
               <a:t>Zweite Ebene</a:t>
             </a:r>
           </a:p>
           <a:p>
             <a:pPr lvl="2"/>
             <a:r>
-              <a:rPr lang="de-DE" smtClean="0"/>
+              <a:rPr lang="de-DE"/>
               <a:t>Dritte Ebene</a:t>
             </a:r>
           </a:p>
           <a:p>
             <a:pPr lvl="3"/>
             <a:r>
-              <a:rPr lang="de-DE" smtClean="0"/>
+              <a:rPr lang="de-DE"/>
               <a:t>Vierte Ebene</a:t>
             </a:r>
           </a:p>
           <a:p>
             <a:pPr lvl="4"/>
             <a:r>
-              <a:rPr lang="de-DE" smtClean="0"/>
+              <a:rPr lang="de-DE"/>
               <a:t>Fünfte Ebene</a:t>
             </a:r>
-            <a:endParaRPr lang="de-DE"/>
           </a:p>
         </p:txBody>
       </p:sp>
@@ -1757,7 +1764,7 @@
           <a:p>
             <a:fld id="{1BA50D42-C9CD-4801-B293-61D1F53EC57E}" type="datetimeFigureOut">
               <a:rPr lang="de-DE" smtClean="0"/>
-              <a:t>03.11.2016</a:t>
+              <a:t>13.11.2017</a:t>
             </a:fld>
             <a:endParaRPr lang="de-DE"/>
           </a:p>
@@ -1850,10 +1857,9 @@
           </a:lstStyle>
           <a:p>
             <a:r>
-              <a:rPr lang="de-DE" smtClean="0"/>
+              <a:rPr lang="de-DE"/>
               <a:t>Titelmasterformat durch Klicken bearbeiten</a:t>
             </a:r>
-            <a:endParaRPr lang="de-DE"/>
           </a:p>
         </p:txBody>
       </p:sp>
@@ -1916,7 +1922,7 @@
           <a:p>
             <a:pPr lvl="0"/>
             <a:r>
-              <a:rPr lang="de-DE" smtClean="0"/>
+              <a:rPr lang="de-DE"/>
               <a:t>Textmasterformate durch Klicken bearbeiten</a:t>
             </a:r>
           </a:p>
@@ -1972,38 +1978,37 @@
           <a:p>
             <a:pPr lvl="0"/>
             <a:r>
-              <a:rPr lang="de-DE" smtClean="0"/>
+              <a:rPr lang="de-DE"/>
               <a:t>Textmasterformate durch Klicken bearbeiten</a:t>
             </a:r>
           </a:p>
           <a:p>
             <a:pPr lvl="1"/>
             <a:r>
-              <a:rPr lang="de-DE" smtClean="0"/>
+              <a:rPr lang="de-DE"/>
               <a:t>Zweite Ebene</a:t>
             </a:r>
           </a:p>
           <a:p>
             <a:pPr lvl="2"/>
             <a:r>
-              <a:rPr lang="de-DE" smtClean="0"/>
+              <a:rPr lang="de-DE"/>
               <a:t>Dritte Ebene</a:t>
             </a:r>
           </a:p>
           <a:p>
             <a:pPr lvl="3"/>
             <a:r>
-              <a:rPr lang="de-DE" smtClean="0"/>
+              <a:rPr lang="de-DE"/>
               <a:t>Vierte Ebene</a:t>
             </a:r>
           </a:p>
           <a:p>
             <a:pPr lvl="4"/>
             <a:r>
-              <a:rPr lang="de-DE" smtClean="0"/>
+              <a:rPr lang="de-DE"/>
               <a:t>Fünfte Ebene</a:t>
             </a:r>
-            <a:endParaRPr lang="de-DE"/>
           </a:p>
         </p:txBody>
       </p:sp>
@@ -2066,7 +2071,7 @@
           <a:p>
             <a:pPr lvl="0"/>
             <a:r>
-              <a:rPr lang="de-DE" smtClean="0"/>
+              <a:rPr lang="de-DE"/>
               <a:t>Textmasterformate durch Klicken bearbeiten</a:t>
             </a:r>
           </a:p>
@@ -2122,38 +2127,37 @@
           <a:p>
             <a:pPr lvl="0"/>
             <a:r>
-              <a:rPr lang="de-DE" smtClean="0"/>
+              <a:rPr lang="de-DE"/>
               <a:t>Textmasterformate durch Klicken bearbeiten</a:t>
             </a:r>
           </a:p>
           <a:p>
             <a:pPr lvl="1"/>
             <a:r>
-              <a:rPr lang="de-DE" smtClean="0"/>
+              <a:rPr lang="de-DE"/>
               <a:t>Zweite Ebene</a:t>
             </a:r>
           </a:p>
           <a:p>
             <a:pPr lvl="2"/>
             <a:r>
-              <a:rPr lang="de-DE" smtClean="0"/>
+              <a:rPr lang="de-DE"/>
               <a:t>Dritte Ebene</a:t>
             </a:r>
           </a:p>
           <a:p>
             <a:pPr lvl="3"/>
             <a:r>
-              <a:rPr lang="de-DE" smtClean="0"/>
+              <a:rPr lang="de-DE"/>
               <a:t>Vierte Ebene</a:t>
             </a:r>
           </a:p>
           <a:p>
             <a:pPr lvl="4"/>
             <a:r>
-              <a:rPr lang="de-DE" smtClean="0"/>
+              <a:rPr lang="de-DE"/>
               <a:t>Fünfte Ebene</a:t>
             </a:r>
-            <a:endParaRPr lang="de-DE"/>
           </a:p>
         </p:txBody>
       </p:sp>
@@ -2174,7 +2178,7 @@
           <a:p>
             <a:fld id="{1BA50D42-C9CD-4801-B293-61D1F53EC57E}" type="datetimeFigureOut">
               <a:rPr lang="de-DE" smtClean="0"/>
-              <a:t>03.11.2016</a:t>
+              <a:t>13.11.2017</a:t>
             </a:fld>
             <a:endParaRPr lang="de-DE"/>
           </a:p>
@@ -2263,10 +2267,9 @@
           <a:lstStyle/>
           <a:p>
             <a:r>
-              <a:rPr lang="de-DE" smtClean="0"/>
+              <a:rPr lang="de-DE"/>
               <a:t>Titelmasterformat durch Klicken bearbeiten</a:t>
             </a:r>
-            <a:endParaRPr lang="de-DE"/>
           </a:p>
         </p:txBody>
       </p:sp>
@@ -2287,7 +2290,7 @@
           <a:p>
             <a:fld id="{1BA50D42-C9CD-4801-B293-61D1F53EC57E}" type="datetimeFigureOut">
               <a:rPr lang="de-DE" smtClean="0"/>
-              <a:t>03.11.2016</a:t>
+              <a:t>13.11.2017</a:t>
             </a:fld>
             <a:endParaRPr lang="de-DE"/>
           </a:p>
@@ -2377,7 +2380,7 @@
           <a:p>
             <a:fld id="{1BA50D42-C9CD-4801-B293-61D1F53EC57E}" type="datetimeFigureOut">
               <a:rPr lang="de-DE" smtClean="0"/>
-              <a:t>03.11.2016</a:t>
+              <a:t>13.11.2017</a:t>
             </a:fld>
             <a:endParaRPr lang="de-DE"/>
           </a:p>
@@ -2475,10 +2478,9 @@
           </a:lstStyle>
           <a:p>
             <a:r>
-              <a:rPr lang="de-DE" smtClean="0"/>
+              <a:rPr lang="de-DE"/>
               <a:t>Titelmasterformat durch Klicken bearbeiten</a:t>
             </a:r>
-            <a:endParaRPr lang="de-DE"/>
           </a:p>
         </p:txBody>
       </p:sp>
@@ -2532,38 +2534,37 @@
           <a:p>
             <a:pPr lvl="0"/>
             <a:r>
-              <a:rPr lang="de-DE" smtClean="0"/>
+              <a:rPr lang="de-DE"/>
               <a:t>Textmasterformate durch Klicken bearbeiten</a:t>
             </a:r>
           </a:p>
           <a:p>
             <a:pPr lvl="1"/>
             <a:r>
-              <a:rPr lang="de-DE" smtClean="0"/>
+              <a:rPr lang="de-DE"/>
               <a:t>Zweite Ebene</a:t>
             </a:r>
           </a:p>
           <a:p>
             <a:pPr lvl="2"/>
             <a:r>
-              <a:rPr lang="de-DE" smtClean="0"/>
+              <a:rPr lang="de-DE"/>
               <a:t>Dritte Ebene</a:t>
             </a:r>
           </a:p>
           <a:p>
             <a:pPr lvl="3"/>
             <a:r>
-              <a:rPr lang="de-DE" smtClean="0"/>
+              <a:rPr lang="de-DE"/>
               <a:t>Vierte Ebene</a:t>
             </a:r>
           </a:p>
           <a:p>
             <a:pPr lvl="4"/>
             <a:r>
-              <a:rPr lang="de-DE" smtClean="0"/>
+              <a:rPr lang="de-DE"/>
               <a:t>Fünfte Ebene</a:t>
             </a:r>
-            <a:endParaRPr lang="de-DE"/>
           </a:p>
         </p:txBody>
       </p:sp>
@@ -2626,7 +2627,7 @@
           <a:p>
             <a:pPr lvl="0"/>
             <a:r>
-              <a:rPr lang="de-DE" smtClean="0"/>
+              <a:rPr lang="de-DE"/>
               <a:t>Textmasterformate durch Klicken bearbeiten</a:t>
             </a:r>
           </a:p>
@@ -2649,7 +2650,7 @@
           <a:p>
             <a:fld id="{1BA50D42-C9CD-4801-B293-61D1F53EC57E}" type="datetimeFigureOut">
               <a:rPr lang="de-DE" smtClean="0"/>
-              <a:t>03.11.2016</a:t>
+              <a:t>13.11.2017</a:t>
             </a:fld>
             <a:endParaRPr lang="de-DE"/>
           </a:p>
@@ -2747,10 +2748,9 @@
           </a:lstStyle>
           <a:p>
             <a:r>
-              <a:rPr lang="de-DE" smtClean="0"/>
+              <a:rPr lang="de-DE"/>
               <a:t>Titelmasterformat durch Klicken bearbeiten</a:t>
             </a:r>
-            <a:endParaRPr lang="de-DE"/>
           </a:p>
         </p:txBody>
       </p:sp>
@@ -2874,7 +2874,7 @@
           <a:p>
             <a:pPr lvl="0"/>
             <a:r>
-              <a:rPr lang="de-DE" smtClean="0"/>
+              <a:rPr lang="de-DE"/>
               <a:t>Textmasterformate durch Klicken bearbeiten</a:t>
             </a:r>
           </a:p>
@@ -2897,7 +2897,7 @@
           <a:p>
             <a:fld id="{1BA50D42-C9CD-4801-B293-61D1F53EC57E}" type="datetimeFigureOut">
               <a:rPr lang="de-DE" smtClean="0"/>
-              <a:t>03.11.2016</a:t>
+              <a:t>13.11.2017</a:t>
             </a:fld>
             <a:endParaRPr lang="de-DE"/>
           </a:p>
@@ -3001,10 +3001,9 @@
           <a:lstStyle/>
           <a:p>
             <a:r>
-              <a:rPr lang="de-DE" smtClean="0"/>
+              <a:rPr lang="de-DE"/>
               <a:t>Titelmasterformat durch Klicken bearbeiten</a:t>
             </a:r>
-            <a:endParaRPr lang="de-DE"/>
           </a:p>
         </p:txBody>
       </p:sp>
@@ -3035,38 +3034,37 @@
           <a:p>
             <a:pPr lvl="0"/>
             <a:r>
-              <a:rPr lang="de-DE" smtClean="0"/>
+              <a:rPr lang="de-DE"/>
               <a:t>Textmasterformate durch Klicken bearbeiten</a:t>
             </a:r>
           </a:p>
           <a:p>
             <a:pPr lvl="1"/>
             <a:r>
-              <a:rPr lang="de-DE" smtClean="0"/>
+              <a:rPr lang="de-DE"/>
               <a:t>Zweite Ebene</a:t>
             </a:r>
           </a:p>
           <a:p>
             <a:pPr lvl="2"/>
             <a:r>
-              <a:rPr lang="de-DE" smtClean="0"/>
+              <a:rPr lang="de-DE"/>
               <a:t>Dritte Ebene</a:t>
             </a:r>
           </a:p>
           <a:p>
             <a:pPr lvl="3"/>
             <a:r>
-              <a:rPr lang="de-DE" smtClean="0"/>
+              <a:rPr lang="de-DE"/>
               <a:t>Vierte Ebene</a:t>
             </a:r>
           </a:p>
           <a:p>
             <a:pPr lvl="4"/>
             <a:r>
-              <a:rPr lang="de-DE" smtClean="0"/>
+              <a:rPr lang="de-DE"/>
               <a:t>Fünfte Ebene</a:t>
             </a:r>
-            <a:endParaRPr lang="de-DE"/>
           </a:p>
         </p:txBody>
       </p:sp>
@@ -3105,7 +3103,7 @@
           <a:p>
             <a:fld id="{1BA50D42-C9CD-4801-B293-61D1F53EC57E}" type="datetimeFigureOut">
               <a:rPr lang="de-DE" smtClean="0"/>
-              <a:t>03.11.2016</a:t>
+              <a:t>13.11.2017</a:t>
             </a:fld>
             <a:endParaRPr lang="de-DE"/>
           </a:p>
@@ -3485,16 +3483,20 @@
             <p:ph type="title"/>
           </p:nvPr>
         </p:nvSpPr>
-        <p:spPr/>
+        <p:spPr>
+          <a:xfrm>
+            <a:off x="457200" y="422540"/>
+            <a:ext cx="8229600" cy="1143000"/>
+          </a:xfrm>
+        </p:spPr>
         <p:txBody>
           <a:bodyPr/>
           <a:lstStyle/>
           <a:p>
             <a:r>
-              <a:rPr lang="de-DE" dirty="0" smtClean="0"/>
+              <a:rPr lang="de-DE" dirty="0"/>
               <a:t>2,8“ NEU</a:t>
             </a:r>
-            <a:endParaRPr lang="de-DE" dirty="0"/>
           </a:p>
         </p:txBody>
       </p:sp>
@@ -6405,7 +6407,7 @@
             <a:p>
               <a:pPr algn="ctr"/>
               <a:r>
-                <a:rPr lang="de-DE" sz="1600" b="1" spc="150" dirty="0" smtClean="0">
+                <a:rPr lang="de-DE" sz="1600" b="1" spc="150" dirty="0">
                   <a:ln w="11430"/>
                   <a:solidFill>
                     <a:srgbClr val="FF0000"/>
@@ -7301,7 +7303,7 @@
             <a:p>
               <a:pPr algn="ctr"/>
               <a:r>
-                <a:rPr lang="de-DE" sz="1600" b="1" spc="150" dirty="0" smtClean="0">
+                <a:rPr lang="de-DE" sz="1600" b="1" spc="150" dirty="0">
                   <a:ln w="11430"/>
                   <a:solidFill>
                     <a:srgbClr val="FF0000"/>
@@ -7894,576 +7896,6 @@
           </a:p>
         </p:txBody>
       </p:sp>
-      <p:grpSp>
-        <p:nvGrpSpPr>
-          <p:cNvPr id="11" name="Gruppieren 10"/>
-          <p:cNvGrpSpPr/>
-          <p:nvPr/>
-        </p:nvGrpSpPr>
-        <p:grpSpPr>
-          <a:xfrm>
-            <a:off x="3066349" y="2317637"/>
-            <a:ext cx="2952328" cy="2214246"/>
-            <a:chOff x="3066349" y="2317637"/>
-            <a:chExt cx="2952328" cy="2214246"/>
-          </a:xfrm>
-        </p:grpSpPr>
-        <p:grpSp>
-          <p:nvGrpSpPr>
-            <p:cNvPr id="115" name="Gruppieren 114"/>
-            <p:cNvGrpSpPr/>
-            <p:nvPr/>
-          </p:nvGrpSpPr>
-          <p:grpSpPr>
-            <a:xfrm>
-              <a:off x="3066349" y="2317637"/>
-              <a:ext cx="2952328" cy="2214246"/>
-              <a:chOff x="0" y="4544951"/>
-              <a:chExt cx="2952328" cy="2214246"/>
-            </a:xfrm>
-            <a:solidFill>
-              <a:schemeClr val="tx1"/>
-            </a:solidFill>
-          </p:grpSpPr>
-          <p:sp>
-            <p:nvSpPr>
-              <p:cNvPr id="134" name="Rechteck 133"/>
-              <p:cNvSpPr>
-                <a:spLocks noChangeAspect="1"/>
-              </p:cNvSpPr>
-              <p:nvPr/>
-            </p:nvSpPr>
-            <p:spPr>
-              <a:xfrm>
-                <a:off x="0" y="4544951"/>
-                <a:ext cx="2952328" cy="2214246"/>
-              </a:xfrm>
-              <a:prstGeom prst="rect">
-                <a:avLst/>
-              </a:prstGeom>
-              <a:grpFill/>
-              <a:ln>
-                <a:noFill/>
-              </a:ln>
-            </p:spPr>
-            <p:style>
-              <a:lnRef idx="2">
-                <a:schemeClr val="accent1">
-                  <a:shade val="50000"/>
-                </a:schemeClr>
-              </a:lnRef>
-              <a:fillRef idx="1">
-                <a:schemeClr val="accent1"/>
-              </a:fillRef>
-              <a:effectRef idx="0">
-                <a:schemeClr val="accent1"/>
-              </a:effectRef>
-              <a:fontRef idx="minor">
-                <a:schemeClr val="lt1"/>
-              </a:fontRef>
-            </p:style>
-            <p:txBody>
-              <a:bodyPr rtlCol="0" anchor="ctr"/>
-              <a:lstStyle/>
-              <a:p>
-                <a:pPr algn="ctr"/>
-                <a:endParaRPr lang="de-DE"/>
-              </a:p>
-            </p:txBody>
-          </p:sp>
-          <p:sp>
-            <p:nvSpPr>
-              <p:cNvPr id="135" name="Rechteck 134"/>
-              <p:cNvSpPr/>
-              <p:nvPr/>
-            </p:nvSpPr>
-            <p:spPr>
-              <a:xfrm>
-                <a:off x="44507" y="4587998"/>
-                <a:ext cx="2202830" cy="276999"/>
-              </a:xfrm>
-              <a:prstGeom prst="rect">
-                <a:avLst/>
-              </a:prstGeom>
-              <a:grpFill/>
-              <a:ln>
-                <a:noFill/>
-              </a:ln>
-              <a:effectLst>
-                <a:outerShdw blurRad="57785" dist="33020" dir="3180000" algn="ctr">
-                  <a:srgbClr val="000000">
-                    <a:alpha val="30000"/>
-                  </a:srgbClr>
-                </a:outerShdw>
-                <a:reflection endPos="0" dir="5400000" sy="-100000" algn="bl" rotWithShape="0"/>
-              </a:effectLst>
-              <a:scene3d>
-                <a:camera prst="orthographicFront">
-                  <a:rot lat="0" lon="0" rev="0"/>
-                </a:camera>
-                <a:lightRig rig="brightRoom" dir="t">
-                  <a:rot lat="0" lon="0" rev="600000"/>
-                </a:lightRig>
-              </a:scene3d>
-              <a:sp3d prstMaterial="metal">
-                <a:bevelT w="38100" h="57150" prst="angle"/>
-              </a:sp3d>
-            </p:spPr>
-            <p:txBody>
-              <a:bodyPr wrap="square" lIns="91440" tIns="45720" rIns="91440" bIns="45720">
-                <a:spAutoFit/>
-                <a:scene3d>
-                  <a:camera prst="orthographicFront"/>
-                  <a:lightRig rig="soft" dir="t">
-                    <a:rot lat="0" lon="0" rev="10800000"/>
-                  </a:lightRig>
-                </a:scene3d>
-                <a:sp3d>
-                  <a:bevelT w="27940" h="12700"/>
-                  <a:contourClr>
-                    <a:srgbClr val="DDDDDD"/>
-                  </a:contourClr>
-                </a:sp3d>
-              </a:bodyPr>
-              <a:lstStyle/>
-              <a:p>
-                <a:r>
-                  <a:rPr lang="de-DE" sz="1200" b="1" dirty="0">
-                    <a:solidFill>
-                      <a:schemeClr val="bg1"/>
-                    </a:solidFill>
-                    <a:latin typeface="Century Schoolbook" panose="02040604050505020304" pitchFamily="18" charset="0"/>
-                    <a:ea typeface="Batang" panose="02030600000101010101" pitchFamily="18" charset="-127"/>
-                    <a:cs typeface="Simplified Arabic Fixed" panose="02070309020205020404" pitchFamily="49" charset="-78"/>
-                  </a:rPr>
-                  <a:t>WLAN-Thermometer</a:t>
-                </a:r>
-              </a:p>
-            </p:txBody>
-          </p:sp>
-        </p:grpSp>
-        <p:sp>
-          <p:nvSpPr>
-            <p:cNvPr id="125" name="Abgerundetes Rechteck 124"/>
-            <p:cNvSpPr/>
-            <p:nvPr/>
-          </p:nvSpPr>
-          <p:spPr>
-            <a:xfrm>
-              <a:off x="3147601" y="3059699"/>
-              <a:ext cx="785542" cy="779342"/>
-            </a:xfrm>
-            <a:prstGeom prst="roundRect">
-              <a:avLst>
-                <a:gd name="adj" fmla="val 25271"/>
-              </a:avLst>
-            </a:prstGeom>
-            <a:gradFill>
-              <a:gsLst>
-                <a:gs pos="0">
-                  <a:schemeClr val="tx1">
-                    <a:lumMod val="85000"/>
-                    <a:lumOff val="15000"/>
-                  </a:schemeClr>
-                </a:gs>
-                <a:gs pos="80000">
-                  <a:schemeClr val="tx1">
-                    <a:lumMod val="65000"/>
-                    <a:lumOff val="35000"/>
-                  </a:schemeClr>
-                </a:gs>
-                <a:gs pos="100000">
-                  <a:schemeClr val="tx1">
-                    <a:lumMod val="50000"/>
-                    <a:lumOff val="50000"/>
-                  </a:schemeClr>
-                </a:gs>
-              </a:gsLst>
-            </a:gradFill>
-            <a:ln>
-              <a:noFill/>
-            </a:ln>
-            <a:effectLst>
-              <a:outerShdw blurRad="50800" dist="50800" dir="5400000" algn="ctr" rotWithShape="0">
-                <a:schemeClr val="tx1"/>
-              </a:outerShdw>
-            </a:effectLst>
-            <a:scene3d>
-              <a:camera prst="orthographicFront">
-                <a:rot lat="0" lon="0" rev="0"/>
-              </a:camera>
-              <a:lightRig rig="chilly" dir="t"/>
-            </a:scene3d>
-            <a:sp3d extrusionH="76200" contourW="19050" prstMaterial="metal">
-              <a:bevelT w="25400" h="25400" prst="artDeco"/>
-              <a:extrusionClr>
-                <a:schemeClr val="bg1">
-                  <a:lumMod val="85000"/>
-                </a:schemeClr>
-              </a:extrusionClr>
-              <a:contourClr>
-                <a:schemeClr val="bg1">
-                  <a:lumMod val="50000"/>
-                </a:schemeClr>
-              </a:contourClr>
-            </a:sp3d>
-          </p:spPr>
-          <p:style>
-            <a:lnRef idx="0">
-              <a:schemeClr val="accent2"/>
-            </a:lnRef>
-            <a:fillRef idx="3">
-              <a:schemeClr val="accent2"/>
-            </a:fillRef>
-            <a:effectRef idx="3">
-              <a:schemeClr val="accent2"/>
-            </a:effectRef>
-            <a:fontRef idx="minor">
-              <a:schemeClr val="lt1"/>
-            </a:fontRef>
-          </p:style>
-          <p:txBody>
-            <a:bodyPr rtlCol="0" anchor="ctr"/>
-            <a:lstStyle/>
-            <a:p>
-              <a:pPr algn="ctr"/>
-              <a:endParaRPr lang="de-DE" sz="1400"/>
-            </a:p>
-          </p:txBody>
-        </p:sp>
-        <p:sp>
-          <p:nvSpPr>
-            <p:cNvPr id="126" name="Abgerundetes Rechteck 125"/>
-            <p:cNvSpPr/>
-            <p:nvPr/>
-          </p:nvSpPr>
-          <p:spPr>
-            <a:xfrm>
-              <a:off x="4149742" y="3061854"/>
-              <a:ext cx="785542" cy="779342"/>
-            </a:xfrm>
-            <a:prstGeom prst="roundRect">
-              <a:avLst>
-                <a:gd name="adj" fmla="val 25271"/>
-              </a:avLst>
-            </a:prstGeom>
-            <a:gradFill>
-              <a:gsLst>
-                <a:gs pos="0">
-                  <a:schemeClr val="tx1">
-                    <a:lumMod val="85000"/>
-                    <a:lumOff val="15000"/>
-                  </a:schemeClr>
-                </a:gs>
-                <a:gs pos="80000">
-                  <a:schemeClr val="tx1">
-                    <a:lumMod val="65000"/>
-                    <a:lumOff val="35000"/>
-                  </a:schemeClr>
-                </a:gs>
-                <a:gs pos="100000">
-                  <a:schemeClr val="tx1">
-                    <a:lumMod val="50000"/>
-                    <a:lumOff val="50000"/>
-                  </a:schemeClr>
-                </a:gs>
-              </a:gsLst>
-            </a:gradFill>
-            <a:ln>
-              <a:noFill/>
-            </a:ln>
-            <a:effectLst>
-              <a:outerShdw blurRad="50800" dist="50800" dir="5400000" algn="ctr" rotWithShape="0">
-                <a:schemeClr val="tx1"/>
-              </a:outerShdw>
-            </a:effectLst>
-            <a:scene3d>
-              <a:camera prst="orthographicFront">
-                <a:rot lat="0" lon="0" rev="0"/>
-              </a:camera>
-              <a:lightRig rig="chilly" dir="t"/>
-            </a:scene3d>
-            <a:sp3d extrusionH="76200" contourW="19050" prstMaterial="metal">
-              <a:bevelT w="25400" h="25400" prst="artDeco"/>
-              <a:extrusionClr>
-                <a:schemeClr val="bg1">
-                  <a:lumMod val="85000"/>
-                </a:schemeClr>
-              </a:extrusionClr>
-              <a:contourClr>
-                <a:schemeClr val="bg1">
-                  <a:lumMod val="50000"/>
-                </a:schemeClr>
-              </a:contourClr>
-            </a:sp3d>
-          </p:spPr>
-          <p:style>
-            <a:lnRef idx="0">
-              <a:schemeClr val="accent2"/>
-            </a:lnRef>
-            <a:fillRef idx="3">
-              <a:schemeClr val="accent2"/>
-            </a:fillRef>
-            <a:effectRef idx="3">
-              <a:schemeClr val="accent2"/>
-            </a:effectRef>
-            <a:fontRef idx="minor">
-              <a:schemeClr val="lt1"/>
-            </a:fontRef>
-          </p:style>
-          <p:txBody>
-            <a:bodyPr rtlCol="0" anchor="ctr"/>
-            <a:lstStyle/>
-            <a:p>
-              <a:pPr algn="ctr"/>
-              <a:endParaRPr lang="de-DE" sz="1400"/>
-            </a:p>
-          </p:txBody>
-        </p:sp>
-        <p:sp>
-          <p:nvSpPr>
-            <p:cNvPr id="128" name="Abgerundetes Rechteck 127"/>
-            <p:cNvSpPr/>
-            <p:nvPr/>
-          </p:nvSpPr>
-          <p:spPr>
-            <a:xfrm>
-              <a:off x="5135860" y="3064060"/>
-              <a:ext cx="785542" cy="779342"/>
-            </a:xfrm>
-            <a:prstGeom prst="roundRect">
-              <a:avLst>
-                <a:gd name="adj" fmla="val 25271"/>
-              </a:avLst>
-            </a:prstGeom>
-            <a:gradFill>
-              <a:gsLst>
-                <a:gs pos="0">
-                  <a:schemeClr val="tx1">
-                    <a:lumMod val="85000"/>
-                    <a:lumOff val="15000"/>
-                  </a:schemeClr>
-                </a:gs>
-                <a:gs pos="80000">
-                  <a:schemeClr val="tx1">
-                    <a:lumMod val="65000"/>
-                    <a:lumOff val="35000"/>
-                  </a:schemeClr>
-                </a:gs>
-                <a:gs pos="100000">
-                  <a:schemeClr val="tx1">
-                    <a:lumMod val="50000"/>
-                    <a:lumOff val="50000"/>
-                  </a:schemeClr>
-                </a:gs>
-              </a:gsLst>
-            </a:gradFill>
-            <a:ln>
-              <a:noFill/>
-            </a:ln>
-            <a:effectLst>
-              <a:outerShdw blurRad="50800" dist="50800" dir="5400000" algn="ctr" rotWithShape="0">
-                <a:schemeClr val="tx1"/>
-              </a:outerShdw>
-            </a:effectLst>
-            <a:scene3d>
-              <a:camera prst="orthographicFront">
-                <a:rot lat="0" lon="0" rev="0"/>
-              </a:camera>
-              <a:lightRig rig="chilly" dir="t"/>
-            </a:scene3d>
-            <a:sp3d extrusionH="76200" contourW="19050" prstMaterial="metal">
-              <a:bevelT w="25400" h="25400" prst="artDeco"/>
-              <a:extrusionClr>
-                <a:schemeClr val="bg1">
-                  <a:lumMod val="85000"/>
-                </a:schemeClr>
-              </a:extrusionClr>
-              <a:contourClr>
-                <a:schemeClr val="bg1">
-                  <a:lumMod val="50000"/>
-                </a:schemeClr>
-              </a:contourClr>
-            </a:sp3d>
-          </p:spPr>
-          <p:style>
-            <a:lnRef idx="0">
-              <a:schemeClr val="accent2"/>
-            </a:lnRef>
-            <a:fillRef idx="3">
-              <a:schemeClr val="accent2"/>
-            </a:fillRef>
-            <a:effectRef idx="3">
-              <a:schemeClr val="accent2"/>
-            </a:effectRef>
-            <a:fontRef idx="minor">
-              <a:schemeClr val="lt1"/>
-            </a:fontRef>
-          </p:style>
-          <p:txBody>
-            <a:bodyPr rtlCol="0" anchor="ctr"/>
-            <a:lstStyle/>
-            <a:p>
-              <a:pPr algn="ctr"/>
-              <a:endParaRPr lang="de-DE" sz="1400"/>
-            </a:p>
-          </p:txBody>
-        </p:sp>
-        <p:pic>
-          <p:nvPicPr>
-            <p:cNvPr id="22" name="Grafik 21"/>
-            <p:cNvPicPr>
-              <a:picLocks noChangeAspect="1"/>
-            </p:cNvPicPr>
-            <p:nvPr/>
-          </p:nvPicPr>
-          <p:blipFill>
-            <a:blip r:embed="rId9" cstate="print">
-              <a:extLst>
-                <a:ext uri="{BEBA8EAE-BF5A-486C-A8C5-ECC9F3942E4B}">
-                  <a14:imgProps xmlns:a14="http://schemas.microsoft.com/office/drawing/2010/main">
-                    <a14:imgLayer r:embed="rId10">
-                      <a14:imgEffect>
-                        <a14:artisticPhotocopy/>
-                      </a14:imgEffect>
-                      <a14:imgEffect>
-                        <a14:sharpenSoften amount="50000"/>
-                      </a14:imgEffect>
-                      <a14:imgEffect>
-                        <a14:colorTemperature colorTemp="7375"/>
-                      </a14:imgEffect>
-                      <a14:imgEffect>
-                        <a14:saturation sat="400000"/>
-                      </a14:imgEffect>
-                      <a14:imgEffect>
-                        <a14:brightnessContrast bright="100000"/>
-                      </a14:imgEffect>
-                    </a14:imgLayer>
-                  </a14:imgProps>
-                </a:ext>
-                <a:ext uri="{28A0092B-C50C-407E-A947-70E740481C1C}">
-                  <a14:useLocalDpi xmlns:a14="http://schemas.microsoft.com/office/drawing/2010/main" val="0"/>
-                </a:ext>
-              </a:extLst>
-            </a:blip>
-            <a:stretch>
-              <a:fillRect/>
-            </a:stretch>
-          </p:blipFill>
-          <p:spPr>
-            <a:xfrm>
-              <a:off x="5231089" y="3154369"/>
-              <a:ext cx="612453" cy="614336"/>
-            </a:xfrm>
-            <a:prstGeom prst="rect">
-              <a:avLst/>
-            </a:prstGeom>
-          </p:spPr>
-        </p:pic>
-        <p:pic>
-          <p:nvPicPr>
-            <p:cNvPr id="3" name="Grafik 2"/>
-            <p:cNvPicPr>
-              <a:picLocks noChangeAspect="1"/>
-            </p:cNvPicPr>
-            <p:nvPr/>
-          </p:nvPicPr>
-          <p:blipFill>
-            <a:blip r:embed="rId11" cstate="print">
-              <a:clrChange>
-                <a:clrFrom>
-                  <a:srgbClr val="FFFFFF"/>
-                </a:clrFrom>
-                <a:clrTo>
-                  <a:srgbClr val="FFFFFF">
-                    <a:alpha val="0"/>
-                  </a:srgbClr>
-                </a:clrTo>
-              </a:clrChange>
-              <a:extLst>
-                <a:ext uri="{BEBA8EAE-BF5A-486C-A8C5-ECC9F3942E4B}">
-                  <a14:imgProps xmlns:a14="http://schemas.microsoft.com/office/drawing/2010/main">
-                    <a14:imgLayer r:embed="rId12">
-                      <a14:imgEffect>
-                        <a14:artisticCrisscrossEtching/>
-                      </a14:imgEffect>
-                      <a14:imgEffect>
-                        <a14:sharpenSoften amount="12000"/>
-                      </a14:imgEffect>
-                      <a14:imgEffect>
-                        <a14:colorTemperature colorTemp="2500"/>
-                      </a14:imgEffect>
-                      <a14:imgEffect>
-                        <a14:saturation sat="400000"/>
-                      </a14:imgEffect>
-                      <a14:imgEffect>
-                        <a14:brightnessContrast bright="89000" contrast="47000"/>
-                      </a14:imgEffect>
-                    </a14:imgLayer>
-                  </a14:imgProps>
-                </a:ext>
-                <a:ext uri="{28A0092B-C50C-407E-A947-70E740481C1C}">
-                  <a14:useLocalDpi xmlns:a14="http://schemas.microsoft.com/office/drawing/2010/main" val="0"/>
-                </a:ext>
-              </a:extLst>
-            </a:blip>
-            <a:stretch>
-              <a:fillRect/>
-            </a:stretch>
-          </p:blipFill>
-          <p:spPr>
-            <a:xfrm>
-              <a:off x="4169683" y="3092799"/>
-              <a:ext cx="747642" cy="747642"/>
-            </a:xfrm>
-            <a:prstGeom prst="rect">
-              <a:avLst/>
-            </a:prstGeom>
-          </p:spPr>
-        </p:pic>
-        <p:pic>
-          <p:nvPicPr>
-            <p:cNvPr id="5" name="Grafik 4"/>
-            <p:cNvPicPr>
-              <a:picLocks noChangeAspect="1"/>
-            </p:cNvPicPr>
-            <p:nvPr/>
-          </p:nvPicPr>
-          <p:blipFill>
-            <a:blip r:embed="rId13" cstate="print">
-              <a:extLst>
-                <a:ext uri="{BEBA8EAE-BF5A-486C-A8C5-ECC9F3942E4B}">
-                  <a14:imgProps xmlns:a14="http://schemas.microsoft.com/office/drawing/2010/main">
-                    <a14:imgLayer r:embed="rId14">
-                      <a14:imgEffect>
-                        <a14:sharpenSoften amount="100000"/>
-                      </a14:imgEffect>
-                      <a14:imgEffect>
-                        <a14:brightnessContrast bright="100000" contrast="100000"/>
-                      </a14:imgEffect>
-                    </a14:imgLayer>
-                  </a14:imgProps>
-                </a:ext>
-                <a:ext uri="{28A0092B-C50C-407E-A947-70E740481C1C}">
-                  <a14:useLocalDpi xmlns:a14="http://schemas.microsoft.com/office/drawing/2010/main" val="0"/>
-                </a:ext>
-              </a:extLst>
-            </a:blip>
-            <a:stretch>
-              <a:fillRect/>
-            </a:stretch>
-          </p:blipFill>
-          <p:spPr>
-            <a:xfrm>
-              <a:off x="3225495" y="3224458"/>
-              <a:ext cx="629754" cy="483650"/>
-            </a:xfrm>
-            <a:prstGeom prst="rect">
-              <a:avLst/>
-            </a:prstGeom>
-          </p:spPr>
-        </p:pic>
-      </p:grpSp>
       <p:sp>
         <p:nvSpPr>
           <p:cNvPr id="346" name="Rechteck 345"/>
@@ -9147,7 +8579,7 @@
           <a:p>
             <a:pPr algn="ctr"/>
             <a:r>
-              <a:rPr lang="de-DE" sz="1600" b="1" spc="150" dirty="0" smtClean="0">
+              <a:rPr lang="de-DE" sz="1600" b="1" spc="150" dirty="0">
                 <a:ln w="11430"/>
                 <a:solidFill>
                   <a:srgbClr val="FF0000"/>
@@ -10043,7 +9475,7 @@
           <a:p>
             <a:pPr algn="ctr"/>
             <a:r>
-              <a:rPr lang="de-DE" sz="1600" b="1" spc="150" dirty="0" smtClean="0">
+              <a:rPr lang="de-DE" sz="1600" b="1" spc="150" dirty="0">
                 <a:ln w="11430"/>
                 <a:solidFill>
                   <a:srgbClr val="FF0000"/>
@@ -10070,7 +9502,7 @@
           <p:nvPr/>
         </p:nvPicPr>
         <p:blipFill rotWithShape="1">
-          <a:blip r:embed="rId15" cstate="print">
+          <a:blip r:embed="rId9" cstate="print">
             <a:clrChange>
               <a:clrFrom>
                 <a:srgbClr val="000000"/>
@@ -10084,7 +9516,7 @@
             <a:extLst>
               <a:ext uri="{BEBA8EAE-BF5A-486C-A8C5-ECC9F3942E4B}">
                 <a14:imgProps xmlns:a14="http://schemas.microsoft.com/office/drawing/2010/main">
-                  <a14:imgLayer r:embed="rId16">
+                  <a14:imgLayer r:embed="rId10">
                     <a14:imgEffect>
                       <a14:sharpenSoften amount="100000"/>
                     </a14:imgEffect>
@@ -10124,11 +9556,11 @@
           <p:nvPr/>
         </p:nvPicPr>
         <p:blipFill>
-          <a:blip r:embed="rId17" cstate="print">
+          <a:blip r:embed="rId11" cstate="print">
             <a:extLst>
               <a:ext uri="{BEBA8EAE-BF5A-486C-A8C5-ECC9F3942E4B}">
                 <a14:imgProps xmlns:a14="http://schemas.microsoft.com/office/drawing/2010/main">
-                  <a14:imgLayer r:embed="rId18">
+                  <a14:imgLayer r:embed="rId12">
                     <a14:imgEffect>
                       <a14:brightnessContrast bright="100000"/>
                     </a14:imgEffect>
@@ -10163,7 +9595,7 @@
           <p:nvPr/>
         </p:nvPicPr>
         <p:blipFill rotWithShape="1">
-          <a:blip r:embed="rId19">
+          <a:blip r:embed="rId13">
             <a:clrChange>
               <a:clrFrom>
                 <a:srgbClr val="010002"/>
@@ -10692,7 +10124,7 @@
           <p:nvPr/>
         </p:nvPicPr>
         <p:blipFill>
-          <a:blip r:embed="rId20" cstate="print">
+          <a:blip r:embed="rId14" cstate="print">
             <a:duotone>
               <a:schemeClr val="accent1">
                 <a:shade val="45000"/>
@@ -10703,7 +10135,7 @@
             <a:extLst>
               <a:ext uri="{BEBA8EAE-BF5A-486C-A8C5-ECC9F3942E4B}">
                 <a14:imgProps xmlns:a14="http://schemas.microsoft.com/office/drawing/2010/main">
-                  <a14:imgLayer r:embed="rId21">
+                  <a14:imgLayer r:embed="rId15">
                     <a14:imgEffect>
                       <a14:artisticPencilSketch/>
                     </a14:imgEffect>
@@ -10751,7 +10183,7 @@
           <p:nvPr/>
         </p:nvPicPr>
         <p:blipFill>
-          <a:blip r:embed="rId22" cstate="print">
+          <a:blip r:embed="rId16" cstate="print">
             <a:clrChange>
               <a:clrFrom>
                 <a:srgbClr val="2D2D2D"/>
@@ -10792,7 +10224,7 @@
           <p:nvPr/>
         </p:nvPicPr>
         <p:blipFill rotWithShape="1">
-          <a:blip r:embed="rId23" cstate="print">
+          <a:blip r:embed="rId17" cstate="print">
             <a:clrChange>
               <a:clrFrom>
                 <a:srgbClr val="000000"/>
@@ -10806,7 +10238,7 @@
             <a:extLst>
               <a:ext uri="{BEBA8EAE-BF5A-486C-A8C5-ECC9F3942E4B}">
                 <a14:imgProps xmlns:a14="http://schemas.microsoft.com/office/drawing/2010/main">
-                  <a14:imgLayer r:embed="rId24">
+                  <a14:imgLayer r:embed="rId18">
                     <a14:imgEffect>
                       <a14:sharpenSoften amount="42000"/>
                     </a14:imgEffect>
@@ -10856,7 +10288,7 @@
           <p:nvPr/>
         </p:nvPicPr>
         <p:blipFill>
-          <a:blip r:embed="rId25" cstate="print">
+          <a:blip r:embed="rId19" cstate="print">
             <a:clrChange>
               <a:clrFrom>
                 <a:srgbClr val="FFFFFF"/>
@@ -10877,7 +10309,7 @@
             <a:extLst>
               <a:ext uri="{BEBA8EAE-BF5A-486C-A8C5-ECC9F3942E4B}">
                 <a14:imgProps xmlns:a14="http://schemas.microsoft.com/office/drawing/2010/main">
-                  <a14:imgLayer r:embed="rId26">
+                  <a14:imgLayer r:embed="rId20">
                     <a14:imgEffect>
                       <a14:sharpenSoften amount="66000"/>
                     </a14:imgEffect>
@@ -10932,11 +10364,11 @@
             <p:nvPr/>
           </p:nvPicPr>
           <p:blipFill>
-            <a:blip r:embed="rId27" cstate="print">
+            <a:blip r:embed="rId21" cstate="print">
               <a:extLst>
                 <a:ext uri="{BEBA8EAE-BF5A-486C-A8C5-ECC9F3942E4B}">
                   <a14:imgProps xmlns:a14="http://schemas.microsoft.com/office/drawing/2010/main">
-                    <a14:imgLayer r:embed="rId28">
+                    <a14:imgLayer r:embed="rId22">
                       <a14:imgEffect>
                         <a14:sharpenSoften amount="100000"/>
                       </a14:imgEffect>
@@ -10974,7 +10406,7 @@
             <p:nvPr/>
           </p:nvPicPr>
           <p:blipFill>
-            <a:blip r:embed="rId29" cstate="print">
+            <a:blip r:embed="rId23" cstate="print">
               <a:lum bright="70000" contrast="-70000"/>
               <a:clrChange>
                 <a:clrFrom>
@@ -10989,7 +10421,7 @@
               <a:extLst>
                 <a:ext uri="{BEBA8EAE-BF5A-486C-A8C5-ECC9F3942E4B}">
                   <a14:imgProps xmlns:a14="http://schemas.microsoft.com/office/drawing/2010/main">
-                    <a14:imgLayer r:embed="rId30">
+                    <a14:imgLayer r:embed="rId24">
                       <a14:imgEffect>
                         <a14:sharpenSoften amount="100000"/>
                       </a14:imgEffect>
@@ -11410,6 +10842,1095 @@
           </p:cxnSp>
         </p:grpSp>
       </p:grpSp>
+      <p:grpSp>
+        <p:nvGrpSpPr>
+          <p:cNvPr id="9" name="Gruppieren 8">
+            <a:extLst>
+              <a:ext uri="{FF2B5EF4-FFF2-40B4-BE49-F238E27FC236}">
+                <a16:creationId xmlns:a16="http://schemas.microsoft.com/office/drawing/2014/main" id="{01C80DCC-E99B-4D90-8EE2-23E0700B72EC}"/>
+              </a:ext>
+            </a:extLst>
+          </p:cNvPr>
+          <p:cNvGrpSpPr/>
+          <p:nvPr/>
+        </p:nvGrpSpPr>
+        <p:grpSpPr>
+          <a:xfrm>
+            <a:off x="3078098" y="2326511"/>
+            <a:ext cx="2952328" cy="2214246"/>
+            <a:chOff x="3078098" y="2326511"/>
+            <a:chExt cx="2952328" cy="2214246"/>
+          </a:xfrm>
+        </p:grpSpPr>
+        <p:grpSp>
+          <p:nvGrpSpPr>
+            <p:cNvPr id="172" name="Gruppieren 171">
+              <a:extLst>
+                <a:ext uri="{FF2B5EF4-FFF2-40B4-BE49-F238E27FC236}">
+                  <a16:creationId xmlns:a16="http://schemas.microsoft.com/office/drawing/2014/main" id="{35EBD76E-E110-4E30-ADAF-18C9A24CF1B1}"/>
+                </a:ext>
+              </a:extLst>
+            </p:cNvPr>
+            <p:cNvGrpSpPr/>
+            <p:nvPr/>
+          </p:nvGrpSpPr>
+          <p:grpSpPr>
+            <a:xfrm>
+              <a:off x="3078098" y="2326511"/>
+              <a:ext cx="2952328" cy="2214246"/>
+              <a:chOff x="-72292" y="4458659"/>
+              <a:chExt cx="2952328" cy="2214246"/>
+            </a:xfrm>
+            <a:solidFill>
+              <a:schemeClr val="tx1"/>
+            </a:solidFill>
+          </p:grpSpPr>
+          <p:sp>
+            <p:nvSpPr>
+              <p:cNvPr id="173" name="Rechteck 172">
+                <a:extLst>
+                  <a:ext uri="{FF2B5EF4-FFF2-40B4-BE49-F238E27FC236}">
+                    <a16:creationId xmlns:a16="http://schemas.microsoft.com/office/drawing/2014/main" id="{3179C365-CF8E-4C45-91BF-43EBADED4C09}"/>
+                  </a:ext>
+                </a:extLst>
+              </p:cNvPr>
+              <p:cNvSpPr>
+                <a:spLocks noChangeAspect="1"/>
+              </p:cNvSpPr>
+              <p:nvPr/>
+            </p:nvSpPr>
+            <p:spPr>
+              <a:xfrm>
+                <a:off x="-72292" y="4458659"/>
+                <a:ext cx="2952328" cy="2214246"/>
+              </a:xfrm>
+              <a:prstGeom prst="rect">
+                <a:avLst/>
+              </a:prstGeom>
+              <a:grpFill/>
+              <a:ln>
+                <a:noFill/>
+              </a:ln>
+            </p:spPr>
+            <p:style>
+              <a:lnRef idx="2">
+                <a:schemeClr val="accent1">
+                  <a:shade val="50000"/>
+                </a:schemeClr>
+              </a:lnRef>
+              <a:fillRef idx="1">
+                <a:schemeClr val="accent1"/>
+              </a:fillRef>
+              <a:effectRef idx="0">
+                <a:schemeClr val="accent1"/>
+              </a:effectRef>
+              <a:fontRef idx="minor">
+                <a:schemeClr val="lt1"/>
+              </a:fontRef>
+            </p:style>
+            <p:txBody>
+              <a:bodyPr rtlCol="0" anchor="ctr"/>
+              <a:lstStyle/>
+              <a:p>
+                <a:pPr algn="ctr"/>
+                <a:endParaRPr lang="de-DE" dirty="0"/>
+              </a:p>
+            </p:txBody>
+          </p:sp>
+          <p:sp>
+            <p:nvSpPr>
+              <p:cNvPr id="174" name="Rechteck 173">
+                <a:extLst>
+                  <a:ext uri="{FF2B5EF4-FFF2-40B4-BE49-F238E27FC236}">
+                    <a16:creationId xmlns:a16="http://schemas.microsoft.com/office/drawing/2014/main" id="{C88DCA3C-4AFD-4982-A5FF-3291E55472C5}"/>
+                  </a:ext>
+                </a:extLst>
+              </p:cNvPr>
+              <p:cNvSpPr/>
+              <p:nvPr/>
+            </p:nvSpPr>
+            <p:spPr>
+              <a:xfrm>
+                <a:off x="-27501" y="4510787"/>
+                <a:ext cx="2202830" cy="276999"/>
+              </a:xfrm>
+              <a:prstGeom prst="rect">
+                <a:avLst/>
+              </a:prstGeom>
+              <a:grpFill/>
+              <a:ln>
+                <a:noFill/>
+              </a:ln>
+              <a:effectLst>
+                <a:outerShdw blurRad="57785" dist="33020" dir="3180000" algn="ctr">
+                  <a:srgbClr val="000000">
+                    <a:alpha val="30000"/>
+                  </a:srgbClr>
+                </a:outerShdw>
+                <a:reflection endPos="0" dir="5400000" sy="-100000" algn="bl" rotWithShape="0"/>
+              </a:effectLst>
+              <a:scene3d>
+                <a:camera prst="orthographicFront">
+                  <a:rot lat="0" lon="0" rev="0"/>
+                </a:camera>
+                <a:lightRig rig="brightRoom" dir="t">
+                  <a:rot lat="0" lon="0" rev="600000"/>
+                </a:lightRig>
+              </a:scene3d>
+              <a:sp3d prstMaterial="metal">
+                <a:bevelT w="38100" h="57150" prst="angle"/>
+              </a:sp3d>
+            </p:spPr>
+            <p:txBody>
+              <a:bodyPr wrap="square" lIns="91440" tIns="45720" rIns="91440" bIns="45720">
+                <a:spAutoFit/>
+                <a:scene3d>
+                  <a:camera prst="orthographicFront"/>
+                  <a:lightRig rig="soft" dir="t">
+                    <a:rot lat="0" lon="0" rev="10800000"/>
+                  </a:lightRig>
+                </a:scene3d>
+                <a:sp3d>
+                  <a:bevelT w="27940" h="12700"/>
+                  <a:contourClr>
+                    <a:srgbClr val="DDDDDD"/>
+                  </a:contourClr>
+                </a:sp3d>
+              </a:bodyPr>
+              <a:lstStyle/>
+              <a:p>
+                <a:r>
+                  <a:rPr lang="de-DE" sz="1200" b="1" dirty="0">
+                    <a:solidFill>
+                      <a:schemeClr val="bg1"/>
+                    </a:solidFill>
+                    <a:latin typeface="Century Schoolbook" panose="02040604050505020304" pitchFamily="18" charset="0"/>
+                    <a:ea typeface="Batang" panose="02030600000101010101" pitchFamily="18" charset="-127"/>
+                    <a:cs typeface="Simplified Arabic Fixed" panose="02070309020205020404" pitchFamily="49" charset="-78"/>
+                  </a:rPr>
+                  <a:t>WLAN-Thermometer</a:t>
+                </a:r>
+              </a:p>
+            </p:txBody>
+          </p:sp>
+        </p:grpSp>
+        <p:sp>
+          <p:nvSpPr>
+            <p:cNvPr id="175" name="Abgerundetes Rechteck 124">
+              <a:extLst>
+                <a:ext uri="{FF2B5EF4-FFF2-40B4-BE49-F238E27FC236}">
+                  <a16:creationId xmlns:a16="http://schemas.microsoft.com/office/drawing/2014/main" id="{727C021F-9718-4598-89D8-1C71A6AB1903}"/>
+                </a:ext>
+              </a:extLst>
+            </p:cNvPr>
+            <p:cNvSpPr/>
+            <p:nvPr/>
+          </p:nvSpPr>
+          <p:spPr>
+            <a:xfrm>
+              <a:off x="3167362" y="2786625"/>
+              <a:ext cx="785542" cy="779342"/>
+            </a:xfrm>
+            <a:prstGeom prst="roundRect">
+              <a:avLst>
+                <a:gd name="adj" fmla="val 25271"/>
+              </a:avLst>
+            </a:prstGeom>
+            <a:gradFill>
+              <a:gsLst>
+                <a:gs pos="0">
+                  <a:schemeClr val="tx1">
+                    <a:lumMod val="85000"/>
+                    <a:lumOff val="15000"/>
+                  </a:schemeClr>
+                </a:gs>
+                <a:gs pos="80000">
+                  <a:schemeClr val="tx1">
+                    <a:lumMod val="65000"/>
+                    <a:lumOff val="35000"/>
+                  </a:schemeClr>
+                </a:gs>
+                <a:gs pos="100000">
+                  <a:schemeClr val="tx1">
+                    <a:lumMod val="50000"/>
+                    <a:lumOff val="50000"/>
+                  </a:schemeClr>
+                </a:gs>
+              </a:gsLst>
+            </a:gradFill>
+            <a:ln>
+              <a:noFill/>
+            </a:ln>
+            <a:effectLst>
+              <a:outerShdw blurRad="50800" dist="50800" dir="5400000" algn="ctr" rotWithShape="0">
+                <a:schemeClr val="tx1"/>
+              </a:outerShdw>
+            </a:effectLst>
+            <a:scene3d>
+              <a:camera prst="orthographicFront">
+                <a:rot lat="0" lon="0" rev="0"/>
+              </a:camera>
+              <a:lightRig rig="chilly" dir="t"/>
+            </a:scene3d>
+            <a:sp3d extrusionH="76200" contourW="19050" prstMaterial="metal">
+              <a:bevelT w="25400" h="25400" prst="artDeco"/>
+              <a:extrusionClr>
+                <a:schemeClr val="bg1">
+                  <a:lumMod val="85000"/>
+                </a:schemeClr>
+              </a:extrusionClr>
+              <a:contourClr>
+                <a:schemeClr val="bg1">
+                  <a:lumMod val="50000"/>
+                </a:schemeClr>
+              </a:contourClr>
+            </a:sp3d>
+          </p:spPr>
+          <p:style>
+            <a:lnRef idx="0">
+              <a:schemeClr val="accent2"/>
+            </a:lnRef>
+            <a:fillRef idx="3">
+              <a:schemeClr val="accent2"/>
+            </a:fillRef>
+            <a:effectRef idx="3">
+              <a:schemeClr val="accent2"/>
+            </a:effectRef>
+            <a:fontRef idx="minor">
+              <a:schemeClr val="lt1"/>
+            </a:fontRef>
+          </p:style>
+          <p:txBody>
+            <a:bodyPr rtlCol="0" anchor="ctr"/>
+            <a:lstStyle/>
+            <a:p>
+              <a:pPr algn="ctr"/>
+              <a:endParaRPr lang="de-DE" sz="1400"/>
+            </a:p>
+          </p:txBody>
+        </p:sp>
+        <p:sp>
+          <p:nvSpPr>
+            <p:cNvPr id="176" name="Abgerundetes Rechteck 125">
+              <a:extLst>
+                <a:ext uri="{FF2B5EF4-FFF2-40B4-BE49-F238E27FC236}">
+                  <a16:creationId xmlns:a16="http://schemas.microsoft.com/office/drawing/2014/main" id="{C6C865EF-02C3-45DC-A48D-7C9D71E85E08}"/>
+                </a:ext>
+              </a:extLst>
+            </p:cNvPr>
+            <p:cNvSpPr/>
+            <p:nvPr/>
+          </p:nvSpPr>
+          <p:spPr>
+            <a:xfrm>
+              <a:off x="4169503" y="2787380"/>
+              <a:ext cx="785542" cy="779342"/>
+            </a:xfrm>
+            <a:prstGeom prst="roundRect">
+              <a:avLst>
+                <a:gd name="adj" fmla="val 25271"/>
+              </a:avLst>
+            </a:prstGeom>
+            <a:gradFill>
+              <a:gsLst>
+                <a:gs pos="0">
+                  <a:schemeClr val="tx1">
+                    <a:lumMod val="85000"/>
+                    <a:lumOff val="15000"/>
+                  </a:schemeClr>
+                </a:gs>
+                <a:gs pos="80000">
+                  <a:schemeClr val="tx1">
+                    <a:lumMod val="65000"/>
+                    <a:lumOff val="35000"/>
+                  </a:schemeClr>
+                </a:gs>
+                <a:gs pos="100000">
+                  <a:schemeClr val="tx1">
+                    <a:lumMod val="50000"/>
+                    <a:lumOff val="50000"/>
+                  </a:schemeClr>
+                </a:gs>
+              </a:gsLst>
+            </a:gradFill>
+            <a:ln>
+              <a:noFill/>
+            </a:ln>
+            <a:effectLst>
+              <a:outerShdw blurRad="50800" dist="50800" dir="5400000" algn="ctr" rotWithShape="0">
+                <a:schemeClr val="tx1"/>
+              </a:outerShdw>
+            </a:effectLst>
+            <a:scene3d>
+              <a:camera prst="orthographicFront">
+                <a:rot lat="0" lon="0" rev="0"/>
+              </a:camera>
+              <a:lightRig rig="chilly" dir="t"/>
+            </a:scene3d>
+            <a:sp3d extrusionH="76200" contourW="19050" prstMaterial="metal">
+              <a:bevelT w="25400" h="25400" prst="artDeco"/>
+              <a:extrusionClr>
+                <a:schemeClr val="bg1">
+                  <a:lumMod val="85000"/>
+                </a:schemeClr>
+              </a:extrusionClr>
+              <a:contourClr>
+                <a:schemeClr val="bg1">
+                  <a:lumMod val="50000"/>
+                </a:schemeClr>
+              </a:contourClr>
+            </a:sp3d>
+          </p:spPr>
+          <p:style>
+            <a:lnRef idx="0">
+              <a:schemeClr val="accent2"/>
+            </a:lnRef>
+            <a:fillRef idx="3">
+              <a:schemeClr val="accent2"/>
+            </a:fillRef>
+            <a:effectRef idx="3">
+              <a:schemeClr val="accent2"/>
+            </a:effectRef>
+            <a:fontRef idx="minor">
+              <a:schemeClr val="lt1"/>
+            </a:fontRef>
+          </p:style>
+          <p:txBody>
+            <a:bodyPr rtlCol="0" anchor="ctr"/>
+            <a:lstStyle/>
+            <a:p>
+              <a:pPr algn="ctr"/>
+              <a:endParaRPr lang="de-DE" sz="1400"/>
+            </a:p>
+          </p:txBody>
+        </p:sp>
+        <p:sp>
+          <p:nvSpPr>
+            <p:cNvPr id="177" name="Abgerundetes Rechteck 127">
+              <a:extLst>
+                <a:ext uri="{FF2B5EF4-FFF2-40B4-BE49-F238E27FC236}">
+                  <a16:creationId xmlns:a16="http://schemas.microsoft.com/office/drawing/2014/main" id="{58476DF4-B3EC-4F1C-9314-73F198C47C73}"/>
+                </a:ext>
+              </a:extLst>
+            </p:cNvPr>
+            <p:cNvSpPr/>
+            <p:nvPr/>
+          </p:nvSpPr>
+          <p:spPr>
+            <a:xfrm>
+              <a:off x="5155621" y="2789586"/>
+              <a:ext cx="785542" cy="779342"/>
+            </a:xfrm>
+            <a:prstGeom prst="roundRect">
+              <a:avLst>
+                <a:gd name="adj" fmla="val 25271"/>
+              </a:avLst>
+            </a:prstGeom>
+            <a:gradFill>
+              <a:gsLst>
+                <a:gs pos="0">
+                  <a:schemeClr val="tx1">
+                    <a:lumMod val="85000"/>
+                    <a:lumOff val="15000"/>
+                  </a:schemeClr>
+                </a:gs>
+                <a:gs pos="80000">
+                  <a:schemeClr val="tx1">
+                    <a:lumMod val="65000"/>
+                    <a:lumOff val="35000"/>
+                  </a:schemeClr>
+                </a:gs>
+                <a:gs pos="100000">
+                  <a:schemeClr val="tx1">
+                    <a:lumMod val="50000"/>
+                    <a:lumOff val="50000"/>
+                  </a:schemeClr>
+                </a:gs>
+              </a:gsLst>
+            </a:gradFill>
+            <a:ln>
+              <a:noFill/>
+            </a:ln>
+            <a:effectLst>
+              <a:outerShdw blurRad="50800" dist="50800" dir="5400000" algn="ctr" rotWithShape="0">
+                <a:schemeClr val="tx1"/>
+              </a:outerShdw>
+            </a:effectLst>
+            <a:scene3d>
+              <a:camera prst="orthographicFront">
+                <a:rot lat="0" lon="0" rev="0"/>
+              </a:camera>
+              <a:lightRig rig="chilly" dir="t"/>
+            </a:scene3d>
+            <a:sp3d extrusionH="76200" contourW="19050" prstMaterial="metal">
+              <a:bevelT w="25400" h="25400" prst="artDeco"/>
+              <a:extrusionClr>
+                <a:schemeClr val="bg1">
+                  <a:lumMod val="85000"/>
+                </a:schemeClr>
+              </a:extrusionClr>
+              <a:contourClr>
+                <a:schemeClr val="bg1">
+                  <a:lumMod val="50000"/>
+                </a:schemeClr>
+              </a:contourClr>
+            </a:sp3d>
+          </p:spPr>
+          <p:style>
+            <a:lnRef idx="0">
+              <a:schemeClr val="accent2"/>
+            </a:lnRef>
+            <a:fillRef idx="3">
+              <a:schemeClr val="accent2"/>
+            </a:fillRef>
+            <a:effectRef idx="3">
+              <a:schemeClr val="accent2"/>
+            </a:effectRef>
+            <a:fontRef idx="minor">
+              <a:schemeClr val="lt1"/>
+            </a:fontRef>
+          </p:style>
+          <p:txBody>
+            <a:bodyPr rtlCol="0" anchor="ctr"/>
+            <a:lstStyle/>
+            <a:p>
+              <a:pPr algn="ctr"/>
+              <a:endParaRPr lang="de-DE" sz="1400"/>
+            </a:p>
+          </p:txBody>
+        </p:sp>
+        <p:pic>
+          <p:nvPicPr>
+            <p:cNvPr id="180" name="Grafik 179">
+              <a:extLst>
+                <a:ext uri="{FF2B5EF4-FFF2-40B4-BE49-F238E27FC236}">
+                  <a16:creationId xmlns:a16="http://schemas.microsoft.com/office/drawing/2014/main" id="{726532BC-D48A-4395-94EF-ABBC1E0B186B}"/>
+                </a:ext>
+              </a:extLst>
+            </p:cNvPr>
+            <p:cNvPicPr>
+              <a:picLocks noChangeAspect="1"/>
+            </p:cNvPicPr>
+            <p:nvPr/>
+          </p:nvPicPr>
+          <p:blipFill>
+            <a:blip r:embed="rId25" cstate="print">
+              <a:extLst>
+                <a:ext uri="{BEBA8EAE-BF5A-486C-A8C5-ECC9F3942E4B}">
+                  <a14:imgProps xmlns:a14="http://schemas.microsoft.com/office/drawing/2010/main">
+                    <a14:imgLayer r:embed="rId26">
+                      <a14:imgEffect>
+                        <a14:artisticPhotocopy/>
+                      </a14:imgEffect>
+                      <a14:imgEffect>
+                        <a14:sharpenSoften amount="50000"/>
+                      </a14:imgEffect>
+                      <a14:imgEffect>
+                        <a14:colorTemperature colorTemp="7375"/>
+                      </a14:imgEffect>
+                      <a14:imgEffect>
+                        <a14:saturation sat="400000"/>
+                      </a14:imgEffect>
+                      <a14:imgEffect>
+                        <a14:brightnessContrast bright="100000"/>
+                      </a14:imgEffect>
+                    </a14:imgLayer>
+                  </a14:imgProps>
+                </a:ext>
+                <a:ext uri="{28A0092B-C50C-407E-A947-70E740481C1C}">
+                  <a14:useLocalDpi xmlns:a14="http://schemas.microsoft.com/office/drawing/2010/main" val="0"/>
+                </a:ext>
+              </a:extLst>
+            </a:blip>
+            <a:stretch>
+              <a:fillRect/>
+            </a:stretch>
+          </p:blipFill>
+          <p:spPr>
+            <a:xfrm>
+              <a:off x="5250850" y="2879895"/>
+              <a:ext cx="612453" cy="614336"/>
+            </a:xfrm>
+            <a:prstGeom prst="rect">
+              <a:avLst/>
+            </a:prstGeom>
+          </p:spPr>
+        </p:pic>
+        <p:pic>
+          <p:nvPicPr>
+            <p:cNvPr id="181" name="Grafik 180">
+              <a:extLst>
+                <a:ext uri="{FF2B5EF4-FFF2-40B4-BE49-F238E27FC236}">
+                  <a16:creationId xmlns:a16="http://schemas.microsoft.com/office/drawing/2014/main" id="{C021C025-7531-48AE-B501-001E683ABBD5}"/>
+                </a:ext>
+              </a:extLst>
+            </p:cNvPr>
+            <p:cNvPicPr>
+              <a:picLocks noChangeAspect="1"/>
+            </p:cNvPicPr>
+            <p:nvPr/>
+          </p:nvPicPr>
+          <p:blipFill>
+            <a:blip r:embed="rId27" cstate="print">
+              <a:clrChange>
+                <a:clrFrom>
+                  <a:srgbClr val="FFFFFF"/>
+                </a:clrFrom>
+                <a:clrTo>
+                  <a:srgbClr val="FFFFFF">
+                    <a:alpha val="0"/>
+                  </a:srgbClr>
+                </a:clrTo>
+              </a:clrChange>
+              <a:extLst>
+                <a:ext uri="{BEBA8EAE-BF5A-486C-A8C5-ECC9F3942E4B}">
+                  <a14:imgProps xmlns:a14="http://schemas.microsoft.com/office/drawing/2010/main">
+                    <a14:imgLayer r:embed="rId28">
+                      <a14:imgEffect>
+                        <a14:artisticCrisscrossEtching/>
+                      </a14:imgEffect>
+                      <a14:imgEffect>
+                        <a14:sharpenSoften amount="12000"/>
+                      </a14:imgEffect>
+                      <a14:imgEffect>
+                        <a14:colorTemperature colorTemp="2500"/>
+                      </a14:imgEffect>
+                      <a14:imgEffect>
+                        <a14:saturation sat="400000"/>
+                      </a14:imgEffect>
+                      <a14:imgEffect>
+                        <a14:brightnessContrast bright="89000" contrast="47000"/>
+                      </a14:imgEffect>
+                    </a14:imgLayer>
+                  </a14:imgProps>
+                </a:ext>
+                <a:ext uri="{28A0092B-C50C-407E-A947-70E740481C1C}">
+                  <a14:useLocalDpi xmlns:a14="http://schemas.microsoft.com/office/drawing/2010/main" val="0"/>
+                </a:ext>
+              </a:extLst>
+            </a:blip>
+            <a:stretch>
+              <a:fillRect/>
+            </a:stretch>
+          </p:blipFill>
+          <p:spPr>
+            <a:xfrm>
+              <a:off x="4189444" y="2818325"/>
+              <a:ext cx="747642" cy="747642"/>
+            </a:xfrm>
+            <a:prstGeom prst="rect">
+              <a:avLst/>
+            </a:prstGeom>
+          </p:spPr>
+        </p:pic>
+        <p:pic>
+          <p:nvPicPr>
+            <p:cNvPr id="182" name="Grafik 181">
+              <a:extLst>
+                <a:ext uri="{FF2B5EF4-FFF2-40B4-BE49-F238E27FC236}">
+                  <a16:creationId xmlns:a16="http://schemas.microsoft.com/office/drawing/2014/main" id="{563F3C87-E8D5-40E5-9526-8425A235372E}"/>
+                </a:ext>
+              </a:extLst>
+            </p:cNvPr>
+            <p:cNvPicPr>
+              <a:picLocks noChangeAspect="1"/>
+            </p:cNvPicPr>
+            <p:nvPr/>
+          </p:nvPicPr>
+          <p:blipFill>
+            <a:blip r:embed="rId29" cstate="print">
+              <a:extLst>
+                <a:ext uri="{BEBA8EAE-BF5A-486C-A8C5-ECC9F3942E4B}">
+                  <a14:imgProps xmlns:a14="http://schemas.microsoft.com/office/drawing/2010/main">
+                    <a14:imgLayer r:embed="rId30">
+                      <a14:imgEffect>
+                        <a14:sharpenSoften amount="100000"/>
+                      </a14:imgEffect>
+                      <a14:imgEffect>
+                        <a14:brightnessContrast bright="100000" contrast="100000"/>
+                      </a14:imgEffect>
+                    </a14:imgLayer>
+                  </a14:imgProps>
+                </a:ext>
+                <a:ext uri="{28A0092B-C50C-407E-A947-70E740481C1C}">
+                  <a14:useLocalDpi xmlns:a14="http://schemas.microsoft.com/office/drawing/2010/main" val="0"/>
+                </a:ext>
+              </a:extLst>
+            </a:blip>
+            <a:stretch>
+              <a:fillRect/>
+            </a:stretch>
+          </p:blipFill>
+          <p:spPr>
+            <a:xfrm>
+              <a:off x="3245256" y="2949984"/>
+              <a:ext cx="629754" cy="483650"/>
+            </a:xfrm>
+            <a:prstGeom prst="rect">
+              <a:avLst/>
+            </a:prstGeom>
+          </p:spPr>
+        </p:pic>
+        <p:sp>
+          <p:nvSpPr>
+            <p:cNvPr id="183" name="Abgerundetes Rechteck 125">
+              <a:extLst>
+                <a:ext uri="{FF2B5EF4-FFF2-40B4-BE49-F238E27FC236}">
+                  <a16:creationId xmlns:a16="http://schemas.microsoft.com/office/drawing/2014/main" id="{E1DF945F-6D2B-48AB-8D39-A16122F3A4BB}"/>
+                </a:ext>
+              </a:extLst>
+            </p:cNvPr>
+            <p:cNvSpPr/>
+            <p:nvPr/>
+          </p:nvSpPr>
+          <p:spPr>
+            <a:xfrm>
+              <a:off x="4169503" y="3673040"/>
+              <a:ext cx="785542" cy="779342"/>
+            </a:xfrm>
+            <a:prstGeom prst="roundRect">
+              <a:avLst>
+                <a:gd name="adj" fmla="val 25271"/>
+              </a:avLst>
+            </a:prstGeom>
+            <a:gradFill>
+              <a:gsLst>
+                <a:gs pos="0">
+                  <a:schemeClr val="tx1">
+                    <a:lumMod val="85000"/>
+                    <a:lumOff val="15000"/>
+                  </a:schemeClr>
+                </a:gs>
+                <a:gs pos="80000">
+                  <a:schemeClr val="tx1">
+                    <a:lumMod val="65000"/>
+                    <a:lumOff val="35000"/>
+                  </a:schemeClr>
+                </a:gs>
+                <a:gs pos="100000">
+                  <a:schemeClr val="tx1">
+                    <a:lumMod val="50000"/>
+                    <a:lumOff val="50000"/>
+                  </a:schemeClr>
+                </a:gs>
+              </a:gsLst>
+            </a:gradFill>
+            <a:ln>
+              <a:noFill/>
+            </a:ln>
+            <a:effectLst>
+              <a:outerShdw blurRad="50800" dist="50800" dir="5400000" algn="ctr" rotWithShape="0">
+                <a:schemeClr val="tx1"/>
+              </a:outerShdw>
+            </a:effectLst>
+            <a:scene3d>
+              <a:camera prst="orthographicFront">
+                <a:rot lat="0" lon="0" rev="0"/>
+              </a:camera>
+              <a:lightRig rig="chilly" dir="t"/>
+            </a:scene3d>
+            <a:sp3d extrusionH="76200" contourW="19050" prstMaterial="metal">
+              <a:bevelT w="25400" h="25400" prst="artDeco"/>
+              <a:extrusionClr>
+                <a:schemeClr val="bg1">
+                  <a:lumMod val="85000"/>
+                </a:schemeClr>
+              </a:extrusionClr>
+              <a:contourClr>
+                <a:schemeClr val="bg1">
+                  <a:lumMod val="50000"/>
+                </a:schemeClr>
+              </a:contourClr>
+            </a:sp3d>
+          </p:spPr>
+          <p:style>
+            <a:lnRef idx="0">
+              <a:schemeClr val="accent2"/>
+            </a:lnRef>
+            <a:fillRef idx="3">
+              <a:schemeClr val="accent2"/>
+            </a:fillRef>
+            <a:effectRef idx="3">
+              <a:schemeClr val="accent2"/>
+            </a:effectRef>
+            <a:fontRef idx="minor">
+              <a:schemeClr val="lt1"/>
+            </a:fontRef>
+          </p:style>
+          <p:txBody>
+            <a:bodyPr rtlCol="0" anchor="ctr"/>
+            <a:lstStyle/>
+            <a:p>
+              <a:pPr algn="ctr"/>
+              <a:endParaRPr lang="de-DE" sz="1400"/>
+            </a:p>
+          </p:txBody>
+        </p:sp>
+        <p:grpSp>
+          <p:nvGrpSpPr>
+            <p:cNvPr id="184" name="Gruppieren 183">
+              <a:extLst>
+                <a:ext uri="{FF2B5EF4-FFF2-40B4-BE49-F238E27FC236}">
+                  <a16:creationId xmlns:a16="http://schemas.microsoft.com/office/drawing/2014/main" id="{0D314CEC-3900-4EE3-B4DE-DB63969F0D5B}"/>
+                </a:ext>
+              </a:extLst>
+            </p:cNvPr>
+            <p:cNvGrpSpPr/>
+            <p:nvPr/>
+          </p:nvGrpSpPr>
+          <p:grpSpPr>
+            <a:xfrm>
+              <a:off x="4306849" y="3788328"/>
+              <a:ext cx="510849" cy="611694"/>
+              <a:chOff x="1475656" y="3708985"/>
+              <a:chExt cx="580803" cy="695457"/>
+            </a:xfrm>
+          </p:grpSpPr>
+          <p:sp>
+            <p:nvSpPr>
+              <p:cNvPr id="185" name="Rechteck 184">
+                <a:extLst>
+                  <a:ext uri="{FF2B5EF4-FFF2-40B4-BE49-F238E27FC236}">
+                    <a16:creationId xmlns:a16="http://schemas.microsoft.com/office/drawing/2014/main" id="{EBEBA7EE-975A-4B75-A382-293868AC8F3B}"/>
+                  </a:ext>
+                </a:extLst>
+              </p:cNvPr>
+              <p:cNvSpPr/>
+              <p:nvPr/>
+            </p:nvSpPr>
+            <p:spPr>
+              <a:xfrm>
+                <a:off x="1475656" y="3708985"/>
+                <a:ext cx="407110" cy="524654"/>
+              </a:xfrm>
+              <a:prstGeom prst="rect">
+                <a:avLst/>
+              </a:prstGeom>
+              <a:noFill/>
+              <a:ln w="38100">
+                <a:solidFill>
+                  <a:schemeClr val="bg1"/>
+                </a:solidFill>
+              </a:ln>
+            </p:spPr>
+            <p:style>
+              <a:lnRef idx="2">
+                <a:schemeClr val="dk1"/>
+              </a:lnRef>
+              <a:fillRef idx="1">
+                <a:schemeClr val="lt1"/>
+              </a:fillRef>
+              <a:effectRef idx="0">
+                <a:schemeClr val="dk1"/>
+              </a:effectRef>
+              <a:fontRef idx="minor">
+                <a:schemeClr val="dk1"/>
+              </a:fontRef>
+            </p:style>
+            <p:txBody>
+              <a:bodyPr rtlCol="0" anchor="ctr"/>
+              <a:lstStyle/>
+              <a:p>
+                <a:pPr algn="ctr"/>
+                <a:endParaRPr lang="de-DE" sz="1400" dirty="0">
+                  <a:latin typeface="Bookman Old Style" panose="02050604050505020204" pitchFamily="18" charset="0"/>
+                </a:endParaRPr>
+              </a:p>
+            </p:txBody>
+          </p:sp>
+          <p:cxnSp>
+            <p:nvCxnSpPr>
+              <p:cNvPr id="186" name="Gerader Verbinder 185">
+                <a:extLst>
+                  <a:ext uri="{FF2B5EF4-FFF2-40B4-BE49-F238E27FC236}">
+                    <a16:creationId xmlns:a16="http://schemas.microsoft.com/office/drawing/2014/main" id="{CEE0E351-9B8A-4517-B5BC-2091417EA0A1}"/>
+                  </a:ext>
+                </a:extLst>
+              </p:cNvPr>
+              <p:cNvCxnSpPr/>
+              <p:nvPr/>
+            </p:nvCxnSpPr>
+            <p:spPr>
+              <a:xfrm>
+                <a:off x="1535195" y="3775327"/>
+                <a:ext cx="288032" cy="0"/>
+              </a:xfrm>
+              <a:prstGeom prst="line">
+                <a:avLst/>
+              </a:prstGeom>
+              <a:ln w="12700">
+                <a:solidFill>
+                  <a:schemeClr val="bg1"/>
+                </a:solidFill>
+              </a:ln>
+            </p:spPr>
+            <p:style>
+              <a:lnRef idx="1">
+                <a:schemeClr val="accent1"/>
+              </a:lnRef>
+              <a:fillRef idx="0">
+                <a:schemeClr val="accent1"/>
+              </a:fillRef>
+              <a:effectRef idx="0">
+                <a:schemeClr val="accent1"/>
+              </a:effectRef>
+              <a:fontRef idx="minor">
+                <a:schemeClr val="tx1"/>
+              </a:fontRef>
+            </p:style>
+          </p:cxnSp>
+          <p:cxnSp>
+            <p:nvCxnSpPr>
+              <p:cNvPr id="187" name="Gerader Verbinder 186">
+                <a:extLst>
+                  <a:ext uri="{FF2B5EF4-FFF2-40B4-BE49-F238E27FC236}">
+                    <a16:creationId xmlns:a16="http://schemas.microsoft.com/office/drawing/2014/main" id="{BB1ADCFD-8C3E-476B-82A8-A144775D33AD}"/>
+                  </a:ext>
+                </a:extLst>
+              </p:cNvPr>
+              <p:cNvCxnSpPr/>
+              <p:nvPr/>
+            </p:nvCxnSpPr>
+            <p:spPr>
+              <a:xfrm>
+                <a:off x="1535195" y="3855719"/>
+                <a:ext cx="288032" cy="0"/>
+              </a:xfrm>
+              <a:prstGeom prst="line">
+                <a:avLst/>
+              </a:prstGeom>
+              <a:ln w="12700">
+                <a:solidFill>
+                  <a:schemeClr val="bg1"/>
+                </a:solidFill>
+              </a:ln>
+            </p:spPr>
+            <p:style>
+              <a:lnRef idx="1">
+                <a:schemeClr val="accent1"/>
+              </a:lnRef>
+              <a:fillRef idx="0">
+                <a:schemeClr val="accent1"/>
+              </a:fillRef>
+              <a:effectRef idx="0">
+                <a:schemeClr val="accent1"/>
+              </a:effectRef>
+              <a:fontRef idx="minor">
+                <a:schemeClr val="tx1"/>
+              </a:fontRef>
+            </p:style>
+          </p:cxnSp>
+          <p:cxnSp>
+            <p:nvCxnSpPr>
+              <p:cNvPr id="188" name="Gerader Verbinder 187">
+                <a:extLst>
+                  <a:ext uri="{FF2B5EF4-FFF2-40B4-BE49-F238E27FC236}">
+                    <a16:creationId xmlns:a16="http://schemas.microsoft.com/office/drawing/2014/main" id="{63842E7E-3640-4641-AB73-9B9F6CD1DD43}"/>
+                  </a:ext>
+                </a:extLst>
+              </p:cNvPr>
+              <p:cNvCxnSpPr/>
+              <p:nvPr/>
+            </p:nvCxnSpPr>
+            <p:spPr>
+              <a:xfrm>
+                <a:off x="1535195" y="3927727"/>
+                <a:ext cx="288032" cy="0"/>
+              </a:xfrm>
+              <a:prstGeom prst="line">
+                <a:avLst/>
+              </a:prstGeom>
+              <a:ln w="12700">
+                <a:solidFill>
+                  <a:schemeClr val="bg1"/>
+                </a:solidFill>
+              </a:ln>
+            </p:spPr>
+            <p:style>
+              <a:lnRef idx="1">
+                <a:schemeClr val="accent1"/>
+              </a:lnRef>
+              <a:fillRef idx="0">
+                <a:schemeClr val="accent1"/>
+              </a:fillRef>
+              <a:effectRef idx="0">
+                <a:schemeClr val="accent1"/>
+              </a:effectRef>
+              <a:fontRef idx="minor">
+                <a:schemeClr val="tx1"/>
+              </a:fontRef>
+            </p:style>
+          </p:cxnSp>
+          <p:cxnSp>
+            <p:nvCxnSpPr>
+              <p:cNvPr id="189" name="Gerader Verbinder 188">
+                <a:extLst>
+                  <a:ext uri="{FF2B5EF4-FFF2-40B4-BE49-F238E27FC236}">
+                    <a16:creationId xmlns:a16="http://schemas.microsoft.com/office/drawing/2014/main" id="{8163A289-B136-4944-A673-B07CC22D85B9}"/>
+                  </a:ext>
+                </a:extLst>
+              </p:cNvPr>
+              <p:cNvCxnSpPr/>
+              <p:nvPr/>
+            </p:nvCxnSpPr>
+            <p:spPr>
+              <a:xfrm>
+                <a:off x="1535195" y="3999735"/>
+                <a:ext cx="288032" cy="0"/>
+              </a:xfrm>
+              <a:prstGeom prst="line">
+                <a:avLst/>
+              </a:prstGeom>
+              <a:ln w="12700">
+                <a:solidFill>
+                  <a:schemeClr val="bg1"/>
+                </a:solidFill>
+              </a:ln>
+            </p:spPr>
+            <p:style>
+              <a:lnRef idx="1">
+                <a:schemeClr val="accent1"/>
+              </a:lnRef>
+              <a:fillRef idx="0">
+                <a:schemeClr val="accent1"/>
+              </a:fillRef>
+              <a:effectRef idx="0">
+                <a:schemeClr val="accent1"/>
+              </a:effectRef>
+              <a:fontRef idx="minor">
+                <a:schemeClr val="tx1"/>
+              </a:fontRef>
+            </p:style>
+          </p:cxnSp>
+          <p:cxnSp>
+            <p:nvCxnSpPr>
+              <p:cNvPr id="190" name="Gerader Verbinder 189">
+                <a:extLst>
+                  <a:ext uri="{FF2B5EF4-FFF2-40B4-BE49-F238E27FC236}">
+                    <a16:creationId xmlns:a16="http://schemas.microsoft.com/office/drawing/2014/main" id="{5E3E8828-9F00-4BB3-9B30-78280E5C395F}"/>
+                  </a:ext>
+                </a:extLst>
+              </p:cNvPr>
+              <p:cNvCxnSpPr/>
+              <p:nvPr/>
+            </p:nvCxnSpPr>
+            <p:spPr>
+              <a:xfrm>
+                <a:off x="1535195" y="4071743"/>
+                <a:ext cx="288032" cy="0"/>
+              </a:xfrm>
+              <a:prstGeom prst="line">
+                <a:avLst/>
+              </a:prstGeom>
+              <a:ln w="12700">
+                <a:solidFill>
+                  <a:schemeClr val="bg1"/>
+                </a:solidFill>
+              </a:ln>
+            </p:spPr>
+            <p:style>
+              <a:lnRef idx="1">
+                <a:schemeClr val="accent1"/>
+              </a:lnRef>
+              <a:fillRef idx="0">
+                <a:schemeClr val="accent1"/>
+              </a:fillRef>
+              <a:effectRef idx="0">
+                <a:schemeClr val="accent1"/>
+              </a:effectRef>
+              <a:fontRef idx="minor">
+                <a:schemeClr val="tx1"/>
+              </a:fontRef>
+            </p:style>
+          </p:cxnSp>
+          <p:cxnSp>
+            <p:nvCxnSpPr>
+              <p:cNvPr id="191" name="Gerader Verbinder 190">
+                <a:extLst>
+                  <a:ext uri="{FF2B5EF4-FFF2-40B4-BE49-F238E27FC236}">
+                    <a16:creationId xmlns:a16="http://schemas.microsoft.com/office/drawing/2014/main" id="{ADDD4064-B0BC-4CD9-8C28-7848D4F220CC}"/>
+                  </a:ext>
+                </a:extLst>
+              </p:cNvPr>
+              <p:cNvCxnSpPr/>
+              <p:nvPr/>
+            </p:nvCxnSpPr>
+            <p:spPr>
+              <a:xfrm>
+                <a:off x="1535195" y="4149080"/>
+                <a:ext cx="288032" cy="0"/>
+              </a:xfrm>
+              <a:prstGeom prst="line">
+                <a:avLst/>
+              </a:prstGeom>
+              <a:ln w="12700">
+                <a:solidFill>
+                  <a:schemeClr val="bg1"/>
+                </a:solidFill>
+              </a:ln>
+            </p:spPr>
+            <p:style>
+              <a:lnRef idx="1">
+                <a:schemeClr val="accent1"/>
+              </a:lnRef>
+              <a:fillRef idx="0">
+                <a:schemeClr val="accent1"/>
+              </a:fillRef>
+              <a:effectRef idx="0">
+                <a:schemeClr val="accent1"/>
+              </a:effectRef>
+              <a:fontRef idx="minor">
+                <a:schemeClr val="tx1"/>
+              </a:fontRef>
+            </p:style>
+          </p:cxnSp>
+          <p:pic>
+            <p:nvPicPr>
+              <p:cNvPr id="192" name="Grafik 191">
+                <a:extLst>
+                  <a:ext uri="{FF2B5EF4-FFF2-40B4-BE49-F238E27FC236}">
+                    <a16:creationId xmlns:a16="http://schemas.microsoft.com/office/drawing/2014/main" id="{44E03BC8-A1B3-4727-BBD7-4E4CD30B113F}"/>
+                  </a:ext>
+                </a:extLst>
+              </p:cNvPr>
+              <p:cNvPicPr>
+                <a:picLocks noChangeAspect="1"/>
+              </p:cNvPicPr>
+              <p:nvPr/>
+            </p:nvPicPr>
+            <p:blipFill>
+              <a:blip r:embed="rId31" cstate="print">
+                <a:extLst>
+                  <a:ext uri="{BEBA8EAE-BF5A-486C-A8C5-ECC9F3942E4B}">
+                    <a14:imgProps xmlns:a14="http://schemas.microsoft.com/office/drawing/2010/main">
+                      <a14:imgLayer r:embed="rId32">
+                        <a14:imgEffect>
+                          <a14:brightnessContrast bright="100000"/>
+                        </a14:imgEffect>
+                      </a14:imgLayer>
+                    </a14:imgProps>
+                  </a:ext>
+                  <a:ext uri="{28A0092B-C50C-407E-A947-70E740481C1C}">
+                    <a14:useLocalDpi xmlns:a14="http://schemas.microsoft.com/office/drawing/2010/main" val="0"/>
+                  </a:ext>
+                </a:extLst>
+              </a:blip>
+              <a:stretch>
+                <a:fillRect/>
+              </a:stretch>
+            </p:blipFill>
+            <p:spPr>
+              <a:xfrm>
+                <a:off x="1691059" y="4043791"/>
+                <a:ext cx="365400" cy="360651"/>
+              </a:xfrm>
+              <a:prstGeom prst="rect">
+                <a:avLst/>
+              </a:prstGeom>
+            </p:spPr>
+          </p:pic>
+        </p:grpSp>
+      </p:grpSp>
     </p:spTree>
     <p:extLst>
       <p:ext uri="{BB962C8B-B14F-4D97-AF65-F5344CB8AC3E}">
@@ -12292,7 +12813,7 @@
               <a:lstStyle/>
               <a:p>
                 <a:r>
-                  <a:rPr lang="de-DE" sz="1100" b="1" dirty="0" smtClean="0">
+                  <a:rPr lang="de-DE" sz="1100" b="1" dirty="0">
                     <a:solidFill>
                       <a:schemeClr val="bg1"/>
                     </a:solidFill>
@@ -12301,13 +12822,6 @@
                   </a:rPr>
                   <a:t>Z</a:t>
                 </a:r>
-                <a:endParaRPr lang="de-DE" sz="1100" b="1" dirty="0">
-                  <a:solidFill>
-                    <a:schemeClr val="bg1"/>
-                  </a:solidFill>
-                  <a:latin typeface="Book Antiqua" panose="02040602050305030304" pitchFamily="18" charset="0"/>
-                  <a:cs typeface="AngsanaUPC" panose="02020603050405020304" pitchFamily="18" charset="-34"/>
-                </a:endParaRPr>
               </a:p>
             </p:txBody>
           </p:sp>
@@ -12334,7 +12848,7 @@
               <a:lstStyle/>
               <a:p>
                 <a:r>
-                  <a:rPr lang="de-DE" sz="800" b="1" dirty="0" smtClean="0">
+                  <a:rPr lang="de-DE" sz="800" b="1" dirty="0">
                     <a:solidFill>
                       <a:schemeClr val="bg1"/>
                     </a:solidFill>
@@ -12343,13 +12857,6 @@
                   </a:rPr>
                   <a:t>Z</a:t>
                 </a:r>
-                <a:endParaRPr lang="de-DE" sz="800" b="1" dirty="0">
-                  <a:solidFill>
-                    <a:schemeClr val="bg1"/>
-                  </a:solidFill>
-                  <a:latin typeface="Book Antiqua" panose="02040602050305030304" pitchFamily="18" charset="0"/>
-                  <a:cs typeface="AngsanaUPC" panose="02020603050405020304" pitchFamily="18" charset="-34"/>
-                </a:endParaRPr>
               </a:p>
             </p:txBody>
           </p:sp>
@@ -12376,7 +12883,7 @@
               <a:lstStyle/>
               <a:p>
                 <a:r>
-                  <a:rPr lang="de-DE" sz="600" b="1" dirty="0" smtClean="0">
+                  <a:rPr lang="de-DE" sz="600" b="1" dirty="0">
                     <a:solidFill>
                       <a:schemeClr val="bg1"/>
                     </a:solidFill>
@@ -12385,13 +12892,6 @@
                   </a:rPr>
                   <a:t>Z</a:t>
                 </a:r>
-                <a:endParaRPr lang="de-DE" sz="600" b="1" dirty="0">
-                  <a:solidFill>
-                    <a:schemeClr val="bg1"/>
-                  </a:solidFill>
-                  <a:latin typeface="Book Antiqua" panose="02040602050305030304" pitchFamily="18" charset="0"/>
-                  <a:cs typeface="AngsanaUPC" panose="02020603050405020304" pitchFamily="18" charset="-34"/>
-                </a:endParaRPr>
               </a:p>
             </p:txBody>
           </p:sp>
@@ -13801,7 +14301,7 @@
             <a:p>
               <a:pPr algn="ctr"/>
               <a:r>
-                <a:rPr lang="de-DE" sz="1600" b="1" spc="150" dirty="0" smtClean="0">
+                <a:rPr lang="de-DE" sz="1600" b="1" spc="150" dirty="0">
                   <a:ln w="11430"/>
                   <a:solidFill>
                     <a:srgbClr val="F8F8F8"/>
@@ -15643,14 +16143,11 @@
             <a:p>
               <a:pPr algn="ctr"/>
               <a:r>
-                <a:rPr lang="de-DE" sz="2000" dirty="0" smtClean="0">
+                <a:rPr lang="de-DE" sz="2000" dirty="0">
                   <a:latin typeface="Bookman Old Style" panose="02050604050505020204" pitchFamily="18" charset="0"/>
                 </a:rPr>
                 <a:t>-</a:t>
               </a:r>
-              <a:endParaRPr lang="de-DE" sz="2000" dirty="0">
-                <a:latin typeface="Bookman Old Style" panose="02050604050505020204" pitchFamily="18" charset="0"/>
-              </a:endParaRPr>
             </a:p>
           </p:txBody>
         </p:sp>
@@ -16647,7 +17144,7 @@
           <a:p>
             <a:pPr algn="ctr"/>
             <a:r>
-              <a:rPr lang="de-DE" sz="1600" b="1" spc="150" dirty="0" smtClean="0">
+              <a:rPr lang="de-DE" sz="1600" b="1" spc="150" dirty="0">
                 <a:ln w="11430"/>
                 <a:solidFill>
                   <a:srgbClr val="F8F8F8"/>
@@ -20799,6 +21296,453 @@
           </a:p>
         </p:txBody>
       </p:sp>
+      <p:grpSp>
+        <p:nvGrpSpPr>
+          <p:cNvPr id="45" name="Gruppieren 44">
+            <a:extLst>
+              <a:ext uri="{FF2B5EF4-FFF2-40B4-BE49-F238E27FC236}">
+                <a16:creationId xmlns:a16="http://schemas.microsoft.com/office/drawing/2014/main" id="{311EC9C5-C85D-4A1C-A19A-3D69B131034E}"/>
+              </a:ext>
+            </a:extLst>
+          </p:cNvPr>
+          <p:cNvGrpSpPr/>
+          <p:nvPr/>
+        </p:nvGrpSpPr>
+        <p:grpSpPr>
+          <a:xfrm>
+            <a:off x="3532567" y="4452357"/>
+            <a:ext cx="1224136" cy="1250909"/>
+            <a:chOff x="1370174" y="1190088"/>
+            <a:chExt cx="1224136" cy="1250909"/>
+          </a:xfrm>
+        </p:grpSpPr>
+        <p:sp>
+          <p:nvSpPr>
+            <p:cNvPr id="46" name="Rechteck 45">
+              <a:extLst>
+                <a:ext uri="{FF2B5EF4-FFF2-40B4-BE49-F238E27FC236}">
+                  <a16:creationId xmlns:a16="http://schemas.microsoft.com/office/drawing/2014/main" id="{330084CA-E9CD-45DB-A04F-5E762A45D005}"/>
+                </a:ext>
+              </a:extLst>
+            </p:cNvPr>
+            <p:cNvSpPr/>
+            <p:nvPr/>
+          </p:nvSpPr>
+          <p:spPr>
+            <a:xfrm>
+              <a:off x="1370174" y="1190088"/>
+              <a:ext cx="1224136" cy="1250909"/>
+            </a:xfrm>
+            <a:prstGeom prst="rect">
+              <a:avLst/>
+            </a:prstGeom>
+            <a:solidFill>
+              <a:schemeClr val="tx1"/>
+            </a:solidFill>
+            <a:ln>
+              <a:noFill/>
+            </a:ln>
+            <a:effectLst/>
+            <a:scene3d>
+              <a:camera prst="orthographicFront">
+                <a:rot lat="0" lon="0" rev="0"/>
+              </a:camera>
+              <a:lightRig rig="threePt" dir="t">
+                <a:rot lat="0" lon="0" rev="1200000"/>
+              </a:lightRig>
+            </a:scene3d>
+            <a:sp3d/>
+          </p:spPr>
+          <p:style>
+            <a:lnRef idx="0">
+              <a:schemeClr val="accent2"/>
+            </a:lnRef>
+            <a:fillRef idx="3">
+              <a:schemeClr val="accent2"/>
+            </a:fillRef>
+            <a:effectRef idx="3">
+              <a:schemeClr val="accent2"/>
+            </a:effectRef>
+            <a:fontRef idx="minor">
+              <a:schemeClr val="lt1"/>
+            </a:fontRef>
+          </p:style>
+          <p:txBody>
+            <a:bodyPr rtlCol="0" anchor="ctr"/>
+            <a:lstStyle/>
+            <a:p>
+              <a:pPr algn="ctr"/>
+              <a:endParaRPr lang="de-DE" sz="1400" dirty="0">
+                <a:latin typeface="Bookman Old Style" panose="02050604050505020204" pitchFamily="18" charset="0"/>
+              </a:endParaRPr>
+            </a:p>
+          </p:txBody>
+        </p:sp>
+        <p:grpSp>
+          <p:nvGrpSpPr>
+            <p:cNvPr id="47" name="Gruppieren 46">
+              <a:extLst>
+                <a:ext uri="{FF2B5EF4-FFF2-40B4-BE49-F238E27FC236}">
+                  <a16:creationId xmlns:a16="http://schemas.microsoft.com/office/drawing/2014/main" id="{6FD198BC-45F9-49BD-B72A-15C3141C47AE}"/>
+                </a:ext>
+              </a:extLst>
+            </p:cNvPr>
+            <p:cNvGrpSpPr/>
+            <p:nvPr/>
+          </p:nvGrpSpPr>
+          <p:grpSpPr>
+            <a:xfrm>
+              <a:off x="1550194" y="1325289"/>
+              <a:ext cx="864096" cy="1034674"/>
+              <a:chOff x="1475656" y="3708985"/>
+              <a:chExt cx="580803" cy="695457"/>
+            </a:xfrm>
+          </p:grpSpPr>
+          <p:sp>
+            <p:nvSpPr>
+              <p:cNvPr id="48" name="Rechteck 47">
+                <a:extLst>
+                  <a:ext uri="{FF2B5EF4-FFF2-40B4-BE49-F238E27FC236}">
+                    <a16:creationId xmlns:a16="http://schemas.microsoft.com/office/drawing/2014/main" id="{E133098A-0864-4181-8C6F-D37F34FDC477}"/>
+                  </a:ext>
+                </a:extLst>
+              </p:cNvPr>
+              <p:cNvSpPr/>
+              <p:nvPr/>
+            </p:nvSpPr>
+            <p:spPr>
+              <a:xfrm>
+                <a:off x="1475656" y="3708985"/>
+                <a:ext cx="407110" cy="524654"/>
+              </a:xfrm>
+              <a:prstGeom prst="rect">
+                <a:avLst/>
+              </a:prstGeom>
+              <a:noFill/>
+              <a:ln w="38100">
+                <a:solidFill>
+                  <a:schemeClr val="bg1"/>
+                </a:solidFill>
+              </a:ln>
+            </p:spPr>
+            <p:style>
+              <a:lnRef idx="2">
+                <a:schemeClr val="dk1"/>
+              </a:lnRef>
+              <a:fillRef idx="1">
+                <a:schemeClr val="lt1"/>
+              </a:fillRef>
+              <a:effectRef idx="0">
+                <a:schemeClr val="dk1"/>
+              </a:effectRef>
+              <a:fontRef idx="minor">
+                <a:schemeClr val="dk1"/>
+              </a:fontRef>
+            </p:style>
+            <p:txBody>
+              <a:bodyPr rtlCol="0" anchor="ctr"/>
+              <a:lstStyle/>
+              <a:p>
+                <a:pPr algn="ctr"/>
+                <a:endParaRPr lang="de-DE" sz="1400" dirty="0">
+                  <a:latin typeface="Bookman Old Style" panose="02050604050505020204" pitchFamily="18" charset="0"/>
+                </a:endParaRPr>
+              </a:p>
+            </p:txBody>
+          </p:sp>
+          <p:cxnSp>
+            <p:nvCxnSpPr>
+              <p:cNvPr id="49" name="Gerader Verbinder 48">
+                <a:extLst>
+                  <a:ext uri="{FF2B5EF4-FFF2-40B4-BE49-F238E27FC236}">
+                    <a16:creationId xmlns:a16="http://schemas.microsoft.com/office/drawing/2014/main" id="{F41DB63B-AA4F-4E48-8A62-5E09A9FDEE7F}"/>
+                  </a:ext>
+                </a:extLst>
+              </p:cNvPr>
+              <p:cNvCxnSpPr/>
+              <p:nvPr/>
+            </p:nvCxnSpPr>
+            <p:spPr>
+              <a:xfrm>
+                <a:off x="1535195" y="3775327"/>
+                <a:ext cx="288032" cy="0"/>
+              </a:xfrm>
+              <a:prstGeom prst="line">
+                <a:avLst/>
+              </a:prstGeom>
+              <a:ln w="12700">
+                <a:solidFill>
+                  <a:schemeClr val="bg1"/>
+                </a:solidFill>
+              </a:ln>
+            </p:spPr>
+            <p:style>
+              <a:lnRef idx="1">
+                <a:schemeClr val="accent1"/>
+              </a:lnRef>
+              <a:fillRef idx="0">
+                <a:schemeClr val="accent1"/>
+              </a:fillRef>
+              <a:effectRef idx="0">
+                <a:schemeClr val="accent1"/>
+              </a:effectRef>
+              <a:fontRef idx="minor">
+                <a:schemeClr val="tx1"/>
+              </a:fontRef>
+            </p:style>
+          </p:cxnSp>
+          <p:cxnSp>
+            <p:nvCxnSpPr>
+              <p:cNvPr id="52" name="Gerader Verbinder 51">
+                <a:extLst>
+                  <a:ext uri="{FF2B5EF4-FFF2-40B4-BE49-F238E27FC236}">
+                    <a16:creationId xmlns:a16="http://schemas.microsoft.com/office/drawing/2014/main" id="{83967F1F-3F5D-40DB-BCA9-1385EB92E741}"/>
+                  </a:ext>
+                </a:extLst>
+              </p:cNvPr>
+              <p:cNvCxnSpPr/>
+              <p:nvPr/>
+            </p:nvCxnSpPr>
+            <p:spPr>
+              <a:xfrm>
+                <a:off x="1535195" y="3855719"/>
+                <a:ext cx="288032" cy="0"/>
+              </a:xfrm>
+              <a:prstGeom prst="line">
+                <a:avLst/>
+              </a:prstGeom>
+              <a:ln w="12700">
+                <a:solidFill>
+                  <a:schemeClr val="bg1"/>
+                </a:solidFill>
+              </a:ln>
+            </p:spPr>
+            <p:style>
+              <a:lnRef idx="1">
+                <a:schemeClr val="accent1"/>
+              </a:lnRef>
+              <a:fillRef idx="0">
+                <a:schemeClr val="accent1"/>
+              </a:fillRef>
+              <a:effectRef idx="0">
+                <a:schemeClr val="accent1"/>
+              </a:effectRef>
+              <a:fontRef idx="minor">
+                <a:schemeClr val="tx1"/>
+              </a:fontRef>
+            </p:style>
+          </p:cxnSp>
+          <p:cxnSp>
+            <p:nvCxnSpPr>
+              <p:cNvPr id="53" name="Gerader Verbinder 52">
+                <a:extLst>
+                  <a:ext uri="{FF2B5EF4-FFF2-40B4-BE49-F238E27FC236}">
+                    <a16:creationId xmlns:a16="http://schemas.microsoft.com/office/drawing/2014/main" id="{BF8C3380-F19F-421D-8A37-DAFD69897DFE}"/>
+                  </a:ext>
+                </a:extLst>
+              </p:cNvPr>
+              <p:cNvCxnSpPr/>
+              <p:nvPr/>
+            </p:nvCxnSpPr>
+            <p:spPr>
+              <a:xfrm>
+                <a:off x="1535195" y="3927727"/>
+                <a:ext cx="288032" cy="0"/>
+              </a:xfrm>
+              <a:prstGeom prst="line">
+                <a:avLst/>
+              </a:prstGeom>
+              <a:ln w="12700">
+                <a:solidFill>
+                  <a:schemeClr val="bg1"/>
+                </a:solidFill>
+              </a:ln>
+            </p:spPr>
+            <p:style>
+              <a:lnRef idx="1">
+                <a:schemeClr val="accent1"/>
+              </a:lnRef>
+              <a:fillRef idx="0">
+                <a:schemeClr val="accent1"/>
+              </a:fillRef>
+              <a:effectRef idx="0">
+                <a:schemeClr val="accent1"/>
+              </a:effectRef>
+              <a:fontRef idx="minor">
+                <a:schemeClr val="tx1"/>
+              </a:fontRef>
+            </p:style>
+          </p:cxnSp>
+          <p:cxnSp>
+            <p:nvCxnSpPr>
+              <p:cNvPr id="54" name="Gerader Verbinder 53">
+                <a:extLst>
+                  <a:ext uri="{FF2B5EF4-FFF2-40B4-BE49-F238E27FC236}">
+                    <a16:creationId xmlns:a16="http://schemas.microsoft.com/office/drawing/2014/main" id="{B07FC778-128F-46DC-B121-32CA39CF59DB}"/>
+                  </a:ext>
+                </a:extLst>
+              </p:cNvPr>
+              <p:cNvCxnSpPr/>
+              <p:nvPr/>
+            </p:nvCxnSpPr>
+            <p:spPr>
+              <a:xfrm>
+                <a:off x="1535195" y="3999735"/>
+                <a:ext cx="288032" cy="0"/>
+              </a:xfrm>
+              <a:prstGeom prst="line">
+                <a:avLst/>
+              </a:prstGeom>
+              <a:ln w="12700">
+                <a:solidFill>
+                  <a:schemeClr val="bg1"/>
+                </a:solidFill>
+              </a:ln>
+            </p:spPr>
+            <p:style>
+              <a:lnRef idx="1">
+                <a:schemeClr val="accent1"/>
+              </a:lnRef>
+              <a:fillRef idx="0">
+                <a:schemeClr val="accent1"/>
+              </a:fillRef>
+              <a:effectRef idx="0">
+                <a:schemeClr val="accent1"/>
+              </a:effectRef>
+              <a:fontRef idx="minor">
+                <a:schemeClr val="tx1"/>
+              </a:fontRef>
+            </p:style>
+          </p:cxnSp>
+          <p:cxnSp>
+            <p:nvCxnSpPr>
+              <p:cNvPr id="55" name="Gerader Verbinder 54">
+                <a:extLst>
+                  <a:ext uri="{FF2B5EF4-FFF2-40B4-BE49-F238E27FC236}">
+                    <a16:creationId xmlns:a16="http://schemas.microsoft.com/office/drawing/2014/main" id="{280DB212-2248-403A-A9FF-2866AA2BEFE3}"/>
+                  </a:ext>
+                </a:extLst>
+              </p:cNvPr>
+              <p:cNvCxnSpPr/>
+              <p:nvPr/>
+            </p:nvCxnSpPr>
+            <p:spPr>
+              <a:xfrm>
+                <a:off x="1535195" y="4071743"/>
+                <a:ext cx="288032" cy="0"/>
+              </a:xfrm>
+              <a:prstGeom prst="line">
+                <a:avLst/>
+              </a:prstGeom>
+              <a:ln w="12700">
+                <a:solidFill>
+                  <a:schemeClr val="bg1"/>
+                </a:solidFill>
+              </a:ln>
+            </p:spPr>
+            <p:style>
+              <a:lnRef idx="1">
+                <a:schemeClr val="accent1"/>
+              </a:lnRef>
+              <a:fillRef idx="0">
+                <a:schemeClr val="accent1"/>
+              </a:fillRef>
+              <a:effectRef idx="0">
+                <a:schemeClr val="accent1"/>
+              </a:effectRef>
+              <a:fontRef idx="minor">
+                <a:schemeClr val="tx1"/>
+              </a:fontRef>
+            </p:style>
+          </p:cxnSp>
+          <p:cxnSp>
+            <p:nvCxnSpPr>
+              <p:cNvPr id="56" name="Gerader Verbinder 55">
+                <a:extLst>
+                  <a:ext uri="{FF2B5EF4-FFF2-40B4-BE49-F238E27FC236}">
+                    <a16:creationId xmlns:a16="http://schemas.microsoft.com/office/drawing/2014/main" id="{0BF3D5BB-EEB4-488F-AF98-643985CB189A}"/>
+                  </a:ext>
+                </a:extLst>
+              </p:cNvPr>
+              <p:cNvCxnSpPr/>
+              <p:nvPr/>
+            </p:nvCxnSpPr>
+            <p:spPr>
+              <a:xfrm>
+                <a:off x="1535195" y="4149080"/>
+                <a:ext cx="288032" cy="0"/>
+              </a:xfrm>
+              <a:prstGeom prst="line">
+                <a:avLst/>
+              </a:prstGeom>
+              <a:ln w="12700">
+                <a:solidFill>
+                  <a:schemeClr val="bg1"/>
+                </a:solidFill>
+              </a:ln>
+            </p:spPr>
+            <p:style>
+              <a:lnRef idx="1">
+                <a:schemeClr val="accent1"/>
+              </a:lnRef>
+              <a:fillRef idx="0">
+                <a:schemeClr val="accent1"/>
+              </a:fillRef>
+              <a:effectRef idx="0">
+                <a:schemeClr val="accent1"/>
+              </a:effectRef>
+              <a:fontRef idx="minor">
+                <a:schemeClr val="tx1"/>
+              </a:fontRef>
+            </p:style>
+          </p:cxnSp>
+          <p:pic>
+            <p:nvPicPr>
+              <p:cNvPr id="57" name="Grafik 56">
+                <a:extLst>
+                  <a:ext uri="{FF2B5EF4-FFF2-40B4-BE49-F238E27FC236}">
+                    <a16:creationId xmlns:a16="http://schemas.microsoft.com/office/drawing/2014/main" id="{AAEBC772-2036-453D-8931-A8820C5ED49A}"/>
+                  </a:ext>
+                </a:extLst>
+              </p:cNvPr>
+              <p:cNvPicPr>
+                <a:picLocks noChangeAspect="1"/>
+              </p:cNvPicPr>
+              <p:nvPr/>
+            </p:nvPicPr>
+            <p:blipFill>
+              <a:blip r:embed="rId5" cstate="print">
+                <a:extLst>
+                  <a:ext uri="{BEBA8EAE-BF5A-486C-A8C5-ECC9F3942E4B}">
+                    <a14:imgProps xmlns:a14="http://schemas.microsoft.com/office/drawing/2010/main">
+                      <a14:imgLayer r:embed="rId6">
+                        <a14:imgEffect>
+                          <a14:brightnessContrast bright="100000"/>
+                        </a14:imgEffect>
+                      </a14:imgLayer>
+                    </a14:imgProps>
+                  </a:ext>
+                  <a:ext uri="{28A0092B-C50C-407E-A947-70E740481C1C}">
+                    <a14:useLocalDpi xmlns:a14="http://schemas.microsoft.com/office/drawing/2010/main" val="0"/>
+                  </a:ext>
+                </a:extLst>
+              </a:blip>
+              <a:stretch>
+                <a:fillRect/>
+              </a:stretch>
+            </p:blipFill>
+            <p:spPr>
+              <a:xfrm>
+                <a:off x="1691059" y="4043791"/>
+                <a:ext cx="365400" cy="360651"/>
+              </a:xfrm>
+              <a:prstGeom prst="rect">
+                <a:avLst/>
+              </a:prstGeom>
+            </p:spPr>
+          </p:pic>
+        </p:grpSp>
+      </p:grpSp>
     </p:spTree>
     <p:extLst>
       <p:ext uri="{BB962C8B-B14F-4D97-AF65-F5344CB8AC3E}">

</xml_diff>